<commit_message>
add explanation of function setup and global vars
</commit_message>
<xml_diff>
--- a/slides/geracao_codigo.pptx
+++ b/slides/geracao_codigo.pptx
@@ -5,7 +5,7 @@
     <p:sldMasterId id="2147483659" r:id="rId1"/>
   </p:sldMasterIdLst>
   <p:notesMasterIdLst>
-    <p:notesMasterId r:id="rId23"/>
+    <p:notesMasterId r:id="rId24"/>
   </p:notesMasterIdLst>
   <p:sldIdLst>
     <p:sldId id="256" r:id="rId2"/>
@@ -26,24 +26,25 @@
     <p:sldId id="266" r:id="rId17"/>
     <p:sldId id="280" r:id="rId18"/>
     <p:sldId id="267" r:id="rId19"/>
-    <p:sldId id="273" r:id="rId20"/>
-    <p:sldId id="269" r:id="rId21"/>
-    <p:sldId id="276" r:id="rId22"/>
+    <p:sldId id="281" r:id="rId20"/>
+    <p:sldId id="273" r:id="rId21"/>
+    <p:sldId id="269" r:id="rId22"/>
+    <p:sldId id="276" r:id="rId23"/>
   </p:sldIdLst>
   <p:sldSz cx="9144000" cy="5143500" type="screen16x9"/>
   <p:notesSz cx="6858000" cy="9144000"/>
   <p:embeddedFontLst>
     <p:embeddedFont>
       <p:font typeface="Maven Pro" panose="020B0604020202020204" charset="0"/>
-      <p:regular r:id="rId24"/>
-      <p:bold r:id="rId25"/>
+      <p:regular r:id="rId25"/>
+      <p:bold r:id="rId26"/>
     </p:embeddedFont>
     <p:embeddedFont>
       <p:font typeface="Nunito" pitchFamily="2" charset="0"/>
-      <p:regular r:id="rId26"/>
-      <p:bold r:id="rId27"/>
-      <p:italic r:id="rId28"/>
-      <p:boldItalic r:id="rId29"/>
+      <p:regular r:id="rId27"/>
+      <p:bold r:id="rId28"/>
+      <p:italic r:id="rId29"/>
+      <p:boldItalic r:id="rId30"/>
     </p:embeddedFont>
   </p:embeddedFontLst>
   <p:defaultTextStyle>
@@ -676,13 +677,13 @@
         <pc:chgData name="Adriano J. Holanda" userId="ff6e826cce1e6f1c" providerId="LiveId" clId="{E026D308-A227-45FE-8F7B-4DF7CC2AECEC}" dt="2023-11-16T19:14:20.121" v="2866" actId="114"/>
         <pc:sldMkLst>
           <pc:docMk/>
-          <pc:sldMk cId="0" sldId="267"/>
+          <pc:sldMk cId="2667334388" sldId="267"/>
         </pc:sldMkLst>
         <pc:spChg chg="mod">
           <ac:chgData name="Adriano J. Holanda" userId="ff6e826cce1e6f1c" providerId="LiveId" clId="{E026D308-A227-45FE-8F7B-4DF7CC2AECEC}" dt="2023-11-16T19:14:20.121" v="2866" actId="114"/>
           <ac:spMkLst>
             <pc:docMk/>
-            <pc:sldMk cId="0" sldId="267"/>
+            <pc:sldMk cId="2667334388" sldId="267"/>
             <ac:spMk id="414" creationId="{00000000-0000-0000-0000-000000000000}"/>
           </ac:spMkLst>
         </pc:spChg>
@@ -690,7 +691,7 @@
           <ac:chgData name="Adriano J. Holanda" userId="ff6e826cce1e6f1c" providerId="LiveId" clId="{E026D308-A227-45FE-8F7B-4DF7CC2AECEC}" dt="2023-11-16T13:09:41.006" v="7" actId="27636"/>
           <ac:spMkLst>
             <pc:docMk/>
-            <pc:sldMk cId="0" sldId="267"/>
+            <pc:sldMk cId="2667334388" sldId="267"/>
             <ac:spMk id="415" creationId="{00000000-0000-0000-0000-000000000000}"/>
           </ac:spMkLst>
         </pc:spChg>
@@ -16786,7 +16787,7 @@
         <p:push/>
       </p:transition>
     </mc:Choice>
-    <mc:Fallback xmlns:ahyp="http://schemas.microsoft.com/office/drawing/2018/hyperlinkcolor" xmlns:p15="http://schemas.microsoft.com/office/powerpoint/2012/main" xmlns:com="http://schemas.openxmlformats.org/drawingml/2006/compatibility" xmlns:pvml="urn:schemas-microsoft-com:office:powerpoint" xmlns:v="urn:schemas-microsoft-com:vml" xmlns:o="urn:schemas-microsoft-com:office:office" xmlns:dgm="http://schemas.openxmlformats.org/drawingml/2006/diagram" xmlns:c="http://schemas.openxmlformats.org/drawingml/2006/chart" xmlns:mv="urn:schemas-microsoft-com:mac:vml" xmlns="">
+    <mc:Fallback xmlns="" xmlns:mv="urn:schemas-microsoft-com:mac:vml" xmlns:c="http://schemas.openxmlformats.org/drawingml/2006/chart" xmlns:dgm="http://schemas.openxmlformats.org/drawingml/2006/diagram" xmlns:o="urn:schemas-microsoft-com:office:office" xmlns:v="urn:schemas-microsoft-com:vml" xmlns:pvml="urn:schemas-microsoft-com:office:powerpoint" xmlns:com="http://schemas.openxmlformats.org/drawingml/2006/compatibility" xmlns:p15="http://schemas.microsoft.com/office/powerpoint/2012/main" xmlns:ahyp="http://schemas.microsoft.com/office/drawing/2018/hyperlinkcolor">
       <p:transition spd="slow">
         <p:fade/>
       </p:transition>
@@ -18183,8 +18184,8 @@
       </p:par>
     </p:tnLst>
     <p:bldLst>
-      <p:bldP spid="4" grpId="0"/>
-      <p:bldP spid="5" grpId="0"/>
+      <p:bldP spid="4" grpId="0" animBg="1"/>
+      <p:bldP spid="5" grpId="0" animBg="1"/>
     </p:bldLst>
   </p:timing>
 </p:sld>
@@ -20642,8 +20643,8 @@
       </p:par>
     </p:tnLst>
     <p:bldLst>
-      <p:bldP spid="4" grpId="0"/>
-      <p:bldP spid="5" grpId="0"/>
+      <p:bldP spid="4" grpId="0" animBg="1"/>
+      <p:bldP spid="5" grpId="0" animBg="1"/>
     </p:bldLst>
   </p:timing>
 </p:sld>
@@ -23068,8 +23069,8 @@
       </p:par>
     </p:tnLst>
     <p:bldLst>
-      <p:bldP spid="4" grpId="0"/>
-      <p:bldP spid="5" grpId="0"/>
+      <p:bldP spid="4" grpId="0" animBg="1"/>
+      <p:bldP spid="5" grpId="0" animBg="1"/>
     </p:bldLst>
   </p:timing>
 </p:sld>
@@ -23953,6 +23954,1767 @@
 </file>
 
 <file path=ppt/slides/slide19.xml><?xml version="1.0" encoding="utf-8"?>
+<p:sld xmlns:a="http://schemas.openxmlformats.org/drawingml/2006/main" xmlns:r="http://schemas.openxmlformats.org/officeDocument/2006/relationships" xmlns:p="http://schemas.openxmlformats.org/presentationml/2006/main">
+  <p:cSld>
+    <p:spTree>
+      <p:nvGrpSpPr>
+        <p:cNvPr id="1" name=""/>
+        <p:cNvGrpSpPr/>
+        <p:nvPr/>
+      </p:nvGrpSpPr>
+      <p:grpSpPr>
+        <a:xfrm>
+          <a:off x="0" y="0"/>
+          <a:ext cx="0" cy="0"/>
+          <a:chOff x="0" y="0"/>
+          <a:chExt cx="0" cy="0"/>
+        </a:xfrm>
+      </p:grpSpPr>
+      <p:sp>
+        <p:nvSpPr>
+          <p:cNvPr id="2" name="Título 1">
+            <a:extLst>
+              <a:ext uri="{FF2B5EF4-FFF2-40B4-BE49-F238E27FC236}">
+                <a16:creationId xmlns:a16="http://schemas.microsoft.com/office/drawing/2014/main" id="{58814535-E626-4042-B106-8817DD27BCF8}"/>
+              </a:ext>
+            </a:extLst>
+          </p:cNvPr>
+          <p:cNvSpPr>
+            <a:spLocks noGrp="1"/>
+          </p:cNvSpPr>
+          <p:nvPr>
+            <p:ph type="title"/>
+          </p:nvPr>
+        </p:nvSpPr>
+        <p:spPr/>
+        <p:txBody>
+          <a:bodyPr/>
+          <a:lstStyle/>
+          <a:p>
+            <a:r>
+              <a:rPr lang="pt-BR" dirty="0"/>
+              <a:t>Função</a:t>
+            </a:r>
+          </a:p>
+        </p:txBody>
+      </p:sp>
+      <p:sp>
+        <p:nvSpPr>
+          <p:cNvPr id="4" name="CaixaDeTexto 3">
+            <a:extLst>
+              <a:ext uri="{FF2B5EF4-FFF2-40B4-BE49-F238E27FC236}">
+                <a16:creationId xmlns:a16="http://schemas.microsoft.com/office/drawing/2014/main" id="{428BF1CC-DF79-4FC8-A9AE-013CE42641AB}"/>
+              </a:ext>
+            </a:extLst>
+          </p:cNvPr>
+          <p:cNvSpPr txBox="1"/>
+          <p:nvPr/>
+        </p:nvSpPr>
+        <p:spPr>
+          <a:xfrm>
+            <a:off x="809700" y="1597875"/>
+            <a:ext cx="7615021" cy="3108543"/>
+          </a:xfrm>
+          <a:prstGeom prst="rect">
+            <a:avLst/>
+          </a:prstGeom>
+          <a:noFill/>
+          <a:ln>
+            <a:solidFill>
+              <a:schemeClr val="accent1"/>
+            </a:solidFill>
+          </a:ln>
+        </p:spPr>
+        <p:txBody>
+          <a:bodyPr wrap="square" rtlCol="0">
+            <a:spAutoFit/>
+          </a:bodyPr>
+          <a:lstStyle/>
+          <a:p>
+            <a:r>
+              <a:rPr lang="en-US" dirty="0">
+                <a:latin typeface="Courier New" panose="02070309020205020404" pitchFamily="49" charset="0"/>
+                <a:cs typeface="Courier New" panose="02070309020205020404" pitchFamily="49" charset="0"/>
+              </a:rPr>
+              <a:t>.text</a:t>
+            </a:r>
+          </a:p>
+          <a:p>
+            <a:r>
+              <a:rPr lang="en-US" dirty="0">
+                <a:latin typeface="Courier New" panose="02070309020205020404" pitchFamily="49" charset="0"/>
+                <a:cs typeface="Courier New" panose="02070309020205020404" pitchFamily="49" charset="0"/>
+              </a:rPr>
+              <a:t>.</a:t>
+            </a:r>
+            <a:r>
+              <a:rPr lang="en-US" dirty="0" err="1">
+                <a:latin typeface="Courier New" panose="02070309020205020404" pitchFamily="49" charset="0"/>
+                <a:cs typeface="Courier New" panose="02070309020205020404" pitchFamily="49" charset="0"/>
+              </a:rPr>
+              <a:t>globl</a:t>
+            </a:r>
+            <a:r>
+              <a:rPr lang="en-US" dirty="0">
+                <a:latin typeface="Courier New" panose="02070309020205020404" pitchFamily="49" charset="0"/>
+                <a:cs typeface="Courier New" panose="02070309020205020404" pitchFamily="49" charset="0"/>
+              </a:rPr>
+              <a:t> </a:t>
+            </a:r>
+            <a:r>
+              <a:rPr lang="en-US" dirty="0" err="1">
+                <a:latin typeface="Courier New" panose="02070309020205020404" pitchFamily="49" charset="0"/>
+                <a:cs typeface="Courier New" panose="02070309020205020404" pitchFamily="49" charset="0"/>
+              </a:rPr>
+              <a:t>func_name</a:t>
+            </a:r>
+            <a:endParaRPr lang="en-US" dirty="0">
+              <a:latin typeface="Courier New" panose="02070309020205020404" pitchFamily="49" charset="0"/>
+              <a:cs typeface="Courier New" panose="02070309020205020404" pitchFamily="49" charset="0"/>
+            </a:endParaRPr>
+          </a:p>
+          <a:p>
+            <a:r>
+              <a:rPr lang="en-US" dirty="0" err="1">
+                <a:latin typeface="Courier New" panose="02070309020205020404" pitchFamily="49" charset="0"/>
+                <a:cs typeface="Courier New" panose="02070309020205020404" pitchFamily="49" charset="0"/>
+              </a:rPr>
+              <a:t>func_name</a:t>
+            </a:r>
+            <a:r>
+              <a:rPr lang="en-US" dirty="0">
+                <a:latin typeface="Courier New" panose="02070309020205020404" pitchFamily="49" charset="0"/>
+                <a:cs typeface="Courier New" panose="02070309020205020404" pitchFamily="49" charset="0"/>
+              </a:rPr>
+              <a:t>:</a:t>
+            </a:r>
+          </a:p>
+          <a:p>
+            <a:r>
+              <a:rPr lang="en-US" dirty="0">
+                <a:latin typeface="Courier New" panose="02070309020205020404" pitchFamily="49" charset="0"/>
+                <a:cs typeface="Courier New" panose="02070309020205020404" pitchFamily="49" charset="0"/>
+              </a:rPr>
+              <a:t>    	# </a:t>
+            </a:r>
+            <a:r>
+              <a:rPr lang="en-US" dirty="0" err="1">
+                <a:latin typeface="Courier New" panose="02070309020205020404" pitchFamily="49" charset="0"/>
+                <a:cs typeface="Courier New" panose="02070309020205020404" pitchFamily="49" charset="0"/>
+              </a:rPr>
+              <a:t>manipulação</a:t>
+            </a:r>
+            <a:r>
+              <a:rPr lang="en-US" dirty="0">
+                <a:latin typeface="Courier New" panose="02070309020205020404" pitchFamily="49" charset="0"/>
+                <a:cs typeface="Courier New" panose="02070309020205020404" pitchFamily="49" charset="0"/>
+              </a:rPr>
+              <a:t> da </a:t>
+            </a:r>
+            <a:r>
+              <a:rPr lang="en-US" dirty="0" err="1">
+                <a:latin typeface="Courier New" panose="02070309020205020404" pitchFamily="49" charset="0"/>
+                <a:cs typeface="Courier New" panose="02070309020205020404" pitchFamily="49" charset="0"/>
+              </a:rPr>
+              <a:t>pilha</a:t>
+            </a:r>
+            <a:endParaRPr lang="en-US" dirty="0">
+              <a:latin typeface="Courier New" panose="02070309020205020404" pitchFamily="49" charset="0"/>
+              <a:cs typeface="Courier New" panose="02070309020205020404" pitchFamily="49" charset="0"/>
+            </a:endParaRPr>
+          </a:p>
+          <a:p>
+            <a:r>
+              <a:rPr lang="en-US" dirty="0">
+                <a:latin typeface="Courier New" panose="02070309020205020404" pitchFamily="49" charset="0"/>
+                <a:cs typeface="Courier New" panose="02070309020205020404" pitchFamily="49" charset="0"/>
+              </a:rPr>
+              <a:t>     	</a:t>
+            </a:r>
+            <a:r>
+              <a:rPr lang="en-US" dirty="0" err="1">
+                <a:latin typeface="Courier New" panose="02070309020205020404" pitchFamily="49" charset="0"/>
+                <a:cs typeface="Courier New" panose="02070309020205020404" pitchFamily="49" charset="0"/>
+              </a:rPr>
+              <a:t>ajusta</a:t>
+            </a:r>
+            <a:r>
+              <a:rPr lang="en-US" dirty="0">
+                <a:latin typeface="Courier New" panose="02070309020205020404" pitchFamily="49" charset="0"/>
+                <a:cs typeface="Courier New" panose="02070309020205020404" pitchFamily="49" charset="0"/>
+              </a:rPr>
+              <a:t> o </a:t>
+            </a:r>
+            <a:r>
+              <a:rPr lang="en-US" dirty="0" err="1">
+                <a:latin typeface="Courier New" panose="02070309020205020404" pitchFamily="49" charset="0"/>
+                <a:cs typeface="Courier New" panose="02070309020205020404" pitchFamily="49" charset="0"/>
+              </a:rPr>
+              <a:t>armazenamento</a:t>
+            </a:r>
+            <a:r>
+              <a:rPr lang="en-US" dirty="0">
+                <a:latin typeface="Courier New" panose="02070309020205020404" pitchFamily="49" charset="0"/>
+                <a:cs typeface="Courier New" panose="02070309020205020404" pitchFamily="49" charset="0"/>
+              </a:rPr>
+              <a:t> dos </a:t>
+            </a:r>
+            <a:r>
+              <a:rPr lang="en-US" dirty="0" err="1">
+                <a:latin typeface="Courier New" panose="02070309020205020404" pitchFamily="49" charset="0"/>
+                <a:cs typeface="Courier New" panose="02070309020205020404" pitchFamily="49" charset="0"/>
+              </a:rPr>
+              <a:t>parâmetros</a:t>
+            </a:r>
+            <a:endParaRPr lang="en-US" dirty="0">
+              <a:latin typeface="Courier New" panose="02070309020205020404" pitchFamily="49" charset="0"/>
+              <a:cs typeface="Courier New" panose="02070309020205020404" pitchFamily="49" charset="0"/>
+            </a:endParaRPr>
+          </a:p>
+          <a:p>
+            <a:r>
+              <a:rPr lang="en-US" dirty="0">
+                <a:latin typeface="Courier New" panose="02070309020205020404" pitchFamily="49" charset="0"/>
+                <a:cs typeface="Courier New" panose="02070309020205020404" pitchFamily="49" charset="0"/>
+              </a:rPr>
+              <a:t>	</a:t>
+            </a:r>
+            <a:r>
+              <a:rPr lang="en-US" dirty="0" err="1">
+                <a:latin typeface="Courier New" panose="02070309020205020404" pitchFamily="49" charset="0"/>
+                <a:cs typeface="Courier New" panose="02070309020205020404" pitchFamily="49" charset="0"/>
+              </a:rPr>
+              <a:t>armazena</a:t>
+            </a:r>
+            <a:r>
+              <a:rPr lang="en-US" dirty="0">
+                <a:latin typeface="Courier New" panose="02070309020205020404" pitchFamily="49" charset="0"/>
+                <a:cs typeface="Courier New" panose="02070309020205020404" pitchFamily="49" charset="0"/>
+              </a:rPr>
+              <a:t> </a:t>
+            </a:r>
+            <a:r>
+              <a:rPr lang="en-US" dirty="0" err="1">
+                <a:latin typeface="Courier New" panose="02070309020205020404" pitchFamily="49" charset="0"/>
+                <a:cs typeface="Courier New" panose="02070309020205020404" pitchFamily="49" charset="0"/>
+              </a:rPr>
+              <a:t>os</a:t>
+            </a:r>
+            <a:r>
+              <a:rPr lang="en-US" dirty="0">
+                <a:latin typeface="Courier New" panose="02070309020205020404" pitchFamily="49" charset="0"/>
+                <a:cs typeface="Courier New" panose="02070309020205020404" pitchFamily="49" charset="0"/>
+              </a:rPr>
+              <a:t> </a:t>
+            </a:r>
+            <a:r>
+              <a:rPr lang="en-US" dirty="0" err="1">
+                <a:latin typeface="Courier New" panose="02070309020205020404" pitchFamily="49" charset="0"/>
+                <a:cs typeface="Courier New" panose="02070309020205020404" pitchFamily="49" charset="0"/>
+              </a:rPr>
+              <a:t>parâmetros</a:t>
+            </a:r>
+            <a:endParaRPr lang="en-US" dirty="0">
+              <a:latin typeface="Courier New" panose="02070309020205020404" pitchFamily="49" charset="0"/>
+              <a:cs typeface="Courier New" panose="02070309020205020404" pitchFamily="49" charset="0"/>
+            </a:endParaRPr>
+          </a:p>
+          <a:p>
+            <a:r>
+              <a:rPr lang="en-US" dirty="0">
+                <a:latin typeface="Courier New" panose="02070309020205020404" pitchFamily="49" charset="0"/>
+                <a:cs typeface="Courier New" panose="02070309020205020404" pitchFamily="49" charset="0"/>
+              </a:rPr>
+              <a:t>	</a:t>
+            </a:r>
+            <a:r>
+              <a:rPr lang="en-US" dirty="0" err="1">
+                <a:latin typeface="Courier New" panose="02070309020205020404" pitchFamily="49" charset="0"/>
+                <a:cs typeface="Courier New" panose="02070309020205020404" pitchFamily="49" charset="0"/>
+              </a:rPr>
+              <a:t>aloca</a:t>
+            </a:r>
+            <a:r>
+              <a:rPr lang="en-US" dirty="0">
+                <a:latin typeface="Courier New" panose="02070309020205020404" pitchFamily="49" charset="0"/>
+                <a:cs typeface="Courier New" panose="02070309020205020404" pitchFamily="49" charset="0"/>
+              </a:rPr>
+              <a:t> as </a:t>
+            </a:r>
+            <a:r>
+              <a:rPr lang="en-US" dirty="0" err="1">
+                <a:latin typeface="Courier New" panose="02070309020205020404" pitchFamily="49" charset="0"/>
+                <a:cs typeface="Courier New" panose="02070309020205020404" pitchFamily="49" charset="0"/>
+              </a:rPr>
+              <a:t>variáveis</a:t>
+            </a:r>
+            <a:r>
+              <a:rPr lang="en-US" dirty="0">
+                <a:latin typeface="Courier New" panose="02070309020205020404" pitchFamily="49" charset="0"/>
+                <a:cs typeface="Courier New" panose="02070309020205020404" pitchFamily="49" charset="0"/>
+              </a:rPr>
+              <a:t> </a:t>
+            </a:r>
+            <a:r>
+              <a:rPr lang="en-US" dirty="0" err="1">
+                <a:latin typeface="Courier New" panose="02070309020205020404" pitchFamily="49" charset="0"/>
+                <a:cs typeface="Courier New" panose="02070309020205020404" pitchFamily="49" charset="0"/>
+              </a:rPr>
+              <a:t>locais</a:t>
+            </a:r>
+            <a:endParaRPr lang="en-US" dirty="0">
+              <a:latin typeface="Courier New" panose="02070309020205020404" pitchFamily="49" charset="0"/>
+              <a:cs typeface="Courier New" panose="02070309020205020404" pitchFamily="49" charset="0"/>
+            </a:endParaRPr>
+          </a:p>
+          <a:p>
+            <a:r>
+              <a:rPr lang="en-US" dirty="0">
+                <a:latin typeface="Courier New" panose="02070309020205020404" pitchFamily="49" charset="0"/>
+                <a:cs typeface="Courier New" panose="02070309020205020404" pitchFamily="49" charset="0"/>
+              </a:rPr>
+              <a:t>	</a:t>
+            </a:r>
+            <a:r>
+              <a:rPr lang="en-US" dirty="0" err="1">
+                <a:latin typeface="Courier New" panose="02070309020205020404" pitchFamily="49" charset="0"/>
+                <a:cs typeface="Courier New" panose="02070309020205020404" pitchFamily="49" charset="0"/>
+              </a:rPr>
+              <a:t>salva</a:t>
+            </a:r>
+            <a:r>
+              <a:rPr lang="en-US" dirty="0">
+                <a:latin typeface="Courier New" panose="02070309020205020404" pitchFamily="49" charset="0"/>
+                <a:cs typeface="Courier New" panose="02070309020205020404" pitchFamily="49" charset="0"/>
+              </a:rPr>
+              <a:t> no </a:t>
+            </a:r>
+            <a:r>
+              <a:rPr lang="en-US" dirty="0" err="1">
+                <a:latin typeface="Courier New" panose="02070309020205020404" pitchFamily="49" charset="0"/>
+                <a:cs typeface="Courier New" panose="02070309020205020404" pitchFamily="49" charset="0"/>
+              </a:rPr>
+              <a:t>registrador</a:t>
+            </a:r>
+            <a:r>
+              <a:rPr lang="en-US" dirty="0">
+                <a:latin typeface="Courier New" panose="02070309020205020404" pitchFamily="49" charset="0"/>
+                <a:cs typeface="Courier New" panose="02070309020205020404" pitchFamily="49" charset="0"/>
+              </a:rPr>
+              <a:t> o </a:t>
+            </a:r>
+            <a:r>
+              <a:rPr lang="en-US" dirty="0" err="1">
+                <a:latin typeface="Courier New" panose="02070309020205020404" pitchFamily="49" charset="0"/>
+                <a:cs typeface="Courier New" panose="02070309020205020404" pitchFamily="49" charset="0"/>
+              </a:rPr>
+              <a:t>endereço</a:t>
+            </a:r>
+            <a:r>
+              <a:rPr lang="en-US" dirty="0">
+                <a:latin typeface="Courier New" panose="02070309020205020404" pitchFamily="49" charset="0"/>
+                <a:cs typeface="Courier New" panose="02070309020205020404" pitchFamily="49" charset="0"/>
+              </a:rPr>
+              <a:t> que </a:t>
+            </a:r>
+            <a:r>
+              <a:rPr lang="en-US" dirty="0" err="1">
+                <a:latin typeface="Courier New" panose="02070309020205020404" pitchFamily="49" charset="0"/>
+                <a:cs typeface="Courier New" panose="02070309020205020404" pitchFamily="49" charset="0"/>
+              </a:rPr>
+              <a:t>chamou</a:t>
+            </a:r>
+            <a:r>
+              <a:rPr lang="en-US" dirty="0">
+                <a:latin typeface="Courier New" panose="02070309020205020404" pitchFamily="49" charset="0"/>
+                <a:cs typeface="Courier New" panose="02070309020205020404" pitchFamily="49" charset="0"/>
+              </a:rPr>
+              <a:t> a </a:t>
+            </a:r>
+            <a:r>
+              <a:rPr lang="en-US" dirty="0" err="1">
+                <a:latin typeface="Courier New" panose="02070309020205020404" pitchFamily="49" charset="0"/>
+                <a:cs typeface="Courier New" panose="02070309020205020404" pitchFamily="49" charset="0"/>
+              </a:rPr>
+              <a:t>função</a:t>
+            </a:r>
+            <a:endParaRPr lang="en-US" dirty="0">
+              <a:latin typeface="Courier New" panose="02070309020205020404" pitchFamily="49" charset="0"/>
+              <a:cs typeface="Courier New" panose="02070309020205020404" pitchFamily="49" charset="0"/>
+            </a:endParaRPr>
+          </a:p>
+          <a:p>
+            <a:r>
+              <a:rPr lang="en-US" dirty="0">
+                <a:latin typeface="Courier New" panose="02070309020205020404" pitchFamily="49" charset="0"/>
+                <a:cs typeface="Courier New" panose="02070309020205020404" pitchFamily="49" charset="0"/>
+              </a:rPr>
+              <a:t>	</a:t>
+            </a:r>
+            <a:r>
+              <a:rPr lang="en-US" b="1" dirty="0">
+                <a:solidFill>
+                  <a:srgbClr val="FF0000"/>
+                </a:solidFill>
+                <a:latin typeface="Courier New" panose="02070309020205020404" pitchFamily="49" charset="0"/>
+                <a:cs typeface="Courier New" panose="02070309020205020404" pitchFamily="49" charset="0"/>
+              </a:rPr>
+              <a:t># </a:t>
+            </a:r>
+            <a:r>
+              <a:rPr lang="en-US" b="1" dirty="0" err="1">
+                <a:solidFill>
+                  <a:srgbClr val="FF0000"/>
+                </a:solidFill>
+                <a:latin typeface="Courier New" panose="02070309020205020404" pitchFamily="49" charset="0"/>
+                <a:cs typeface="Courier New" panose="02070309020205020404" pitchFamily="49" charset="0"/>
+              </a:rPr>
+              <a:t>lista</a:t>
+            </a:r>
+            <a:r>
+              <a:rPr lang="en-US" b="1" dirty="0">
+                <a:solidFill>
+                  <a:srgbClr val="FF0000"/>
+                </a:solidFill>
+                <a:latin typeface="Courier New" panose="02070309020205020404" pitchFamily="49" charset="0"/>
+                <a:cs typeface="Courier New" panose="02070309020205020404" pitchFamily="49" charset="0"/>
+              </a:rPr>
+              <a:t> de </a:t>
+            </a:r>
+            <a:r>
+              <a:rPr lang="en-US" b="1" dirty="0" err="1">
+                <a:solidFill>
+                  <a:srgbClr val="FF0000"/>
+                </a:solidFill>
+                <a:latin typeface="Courier New" panose="02070309020205020404" pitchFamily="49" charset="0"/>
+                <a:cs typeface="Courier New" panose="02070309020205020404" pitchFamily="49" charset="0"/>
+              </a:rPr>
+              <a:t>instruções</a:t>
+            </a:r>
+            <a:endParaRPr lang="en-US" b="1" dirty="0">
+              <a:solidFill>
+                <a:srgbClr val="FF0000"/>
+              </a:solidFill>
+              <a:latin typeface="Courier New" panose="02070309020205020404" pitchFamily="49" charset="0"/>
+              <a:cs typeface="Courier New" panose="02070309020205020404" pitchFamily="49" charset="0"/>
+            </a:endParaRPr>
+          </a:p>
+          <a:p>
+            <a:r>
+              <a:rPr lang="en-US" dirty="0" err="1">
+                <a:latin typeface="Courier New" panose="02070309020205020404" pitchFamily="49" charset="0"/>
+                <a:cs typeface="Courier New" panose="02070309020205020404" pitchFamily="49" charset="0"/>
+              </a:rPr>
+              <a:t>func_name_end</a:t>
+            </a:r>
+            <a:r>
+              <a:rPr lang="en-US" dirty="0">
+                <a:latin typeface="Courier New" panose="02070309020205020404" pitchFamily="49" charset="0"/>
+                <a:cs typeface="Courier New" panose="02070309020205020404" pitchFamily="49" charset="0"/>
+              </a:rPr>
+              <a:t>:</a:t>
+            </a:r>
+          </a:p>
+          <a:p>
+            <a:r>
+              <a:rPr lang="en-US" dirty="0">
+                <a:latin typeface="Courier New" panose="02070309020205020404" pitchFamily="49" charset="0"/>
+                <a:cs typeface="Courier New" panose="02070309020205020404" pitchFamily="49" charset="0"/>
+              </a:rPr>
+              <a:t>	libera </a:t>
+            </a:r>
+            <a:r>
+              <a:rPr lang="en-US" dirty="0" err="1">
+                <a:latin typeface="Courier New" panose="02070309020205020404" pitchFamily="49" charset="0"/>
+                <a:cs typeface="Courier New" panose="02070309020205020404" pitchFamily="49" charset="0"/>
+              </a:rPr>
+              <a:t>variáveis</a:t>
+            </a:r>
+            <a:r>
+              <a:rPr lang="en-US" dirty="0">
+                <a:latin typeface="Courier New" panose="02070309020205020404" pitchFamily="49" charset="0"/>
+                <a:cs typeface="Courier New" panose="02070309020205020404" pitchFamily="49" charset="0"/>
+              </a:rPr>
+              <a:t> </a:t>
+            </a:r>
+            <a:r>
+              <a:rPr lang="en-US" dirty="0" err="1">
+                <a:latin typeface="Courier New" panose="02070309020205020404" pitchFamily="49" charset="0"/>
+                <a:cs typeface="Courier New" panose="02070309020205020404" pitchFamily="49" charset="0"/>
+              </a:rPr>
+              <a:t>locais</a:t>
+            </a:r>
+            <a:endParaRPr lang="en-US" dirty="0">
+              <a:latin typeface="Courier New" panose="02070309020205020404" pitchFamily="49" charset="0"/>
+              <a:cs typeface="Courier New" panose="02070309020205020404" pitchFamily="49" charset="0"/>
+            </a:endParaRPr>
+          </a:p>
+          <a:p>
+            <a:r>
+              <a:rPr lang="en-US" dirty="0">
+                <a:latin typeface="Courier New" panose="02070309020205020404" pitchFamily="49" charset="0"/>
+                <a:cs typeface="Courier New" panose="02070309020205020404" pitchFamily="49" charset="0"/>
+              </a:rPr>
+              <a:t>	libera </a:t>
+            </a:r>
+            <a:r>
+              <a:rPr lang="en-US" dirty="0" err="1">
+                <a:latin typeface="Courier New" panose="02070309020205020404" pitchFamily="49" charset="0"/>
+                <a:cs typeface="Courier New" panose="02070309020205020404" pitchFamily="49" charset="0"/>
+              </a:rPr>
+              <a:t>os</a:t>
+            </a:r>
+            <a:r>
+              <a:rPr lang="en-US" dirty="0">
+                <a:latin typeface="Courier New" panose="02070309020205020404" pitchFamily="49" charset="0"/>
+                <a:cs typeface="Courier New" panose="02070309020205020404" pitchFamily="49" charset="0"/>
+              </a:rPr>
+              <a:t> </a:t>
+            </a:r>
+            <a:r>
+              <a:rPr lang="en-US" dirty="0" err="1">
+                <a:latin typeface="Courier New" panose="02070309020205020404" pitchFamily="49" charset="0"/>
+                <a:cs typeface="Courier New" panose="02070309020205020404" pitchFamily="49" charset="0"/>
+              </a:rPr>
+              <a:t>parâmetros</a:t>
+            </a:r>
+            <a:endParaRPr lang="en-US" dirty="0">
+              <a:latin typeface="Courier New" panose="02070309020205020404" pitchFamily="49" charset="0"/>
+              <a:cs typeface="Courier New" panose="02070309020205020404" pitchFamily="49" charset="0"/>
+            </a:endParaRPr>
+          </a:p>
+          <a:p>
+            <a:r>
+              <a:rPr lang="en-US" dirty="0">
+                <a:latin typeface="Courier New" panose="02070309020205020404" pitchFamily="49" charset="0"/>
+                <a:cs typeface="Courier New" panose="02070309020205020404" pitchFamily="49" charset="0"/>
+              </a:rPr>
+              <a:t>	</a:t>
+            </a:r>
+            <a:r>
+              <a:rPr lang="en-US" dirty="0" err="1">
+                <a:latin typeface="Courier New" panose="02070309020205020404" pitchFamily="49" charset="0"/>
+                <a:cs typeface="Courier New" panose="02070309020205020404" pitchFamily="49" charset="0"/>
+              </a:rPr>
+              <a:t>retorna</a:t>
+            </a:r>
+            <a:r>
+              <a:rPr lang="en-US" dirty="0">
+                <a:latin typeface="Courier New" panose="02070309020205020404" pitchFamily="49" charset="0"/>
+                <a:cs typeface="Courier New" panose="02070309020205020404" pitchFamily="49" charset="0"/>
+              </a:rPr>
+              <a:t> para o </a:t>
+            </a:r>
+            <a:r>
+              <a:rPr lang="en-US" dirty="0" err="1">
+                <a:latin typeface="Courier New" panose="02070309020205020404" pitchFamily="49" charset="0"/>
+                <a:cs typeface="Courier New" panose="02070309020205020404" pitchFamily="49" charset="0"/>
+              </a:rPr>
+              <a:t>endereço</a:t>
+            </a:r>
+            <a:r>
+              <a:rPr lang="en-US" dirty="0">
+                <a:latin typeface="Courier New" panose="02070309020205020404" pitchFamily="49" charset="0"/>
+                <a:cs typeface="Courier New" panose="02070309020205020404" pitchFamily="49" charset="0"/>
+              </a:rPr>
+              <a:t> </a:t>
+            </a:r>
+            <a:r>
+              <a:rPr lang="en-US" dirty="0" err="1">
+                <a:latin typeface="Courier New" panose="02070309020205020404" pitchFamily="49" charset="0"/>
+                <a:cs typeface="Courier New" panose="02070309020205020404" pitchFamily="49" charset="0"/>
+              </a:rPr>
+              <a:t>após</a:t>
+            </a:r>
+            <a:r>
+              <a:rPr lang="en-US" dirty="0">
+                <a:latin typeface="Courier New" panose="02070309020205020404" pitchFamily="49" charset="0"/>
+                <a:cs typeface="Courier New" panose="02070309020205020404" pitchFamily="49" charset="0"/>
+              </a:rPr>
+              <a:t> a </a:t>
+            </a:r>
+            <a:r>
+              <a:rPr lang="en-US" dirty="0" err="1">
+                <a:latin typeface="Courier New" panose="02070309020205020404" pitchFamily="49" charset="0"/>
+                <a:cs typeface="Courier New" panose="02070309020205020404" pitchFamily="49" charset="0"/>
+              </a:rPr>
+              <a:t>chamada</a:t>
+            </a:r>
+            <a:r>
+              <a:rPr lang="en-US" dirty="0">
+                <a:latin typeface="Courier New" panose="02070309020205020404" pitchFamily="49" charset="0"/>
+                <a:cs typeface="Courier New" panose="02070309020205020404" pitchFamily="49" charset="0"/>
+              </a:rPr>
+              <a:t> de </a:t>
+            </a:r>
+            <a:r>
+              <a:rPr lang="en-US" dirty="0" err="1">
+                <a:latin typeface="Courier New" panose="02070309020205020404" pitchFamily="49" charset="0"/>
+                <a:cs typeface="Courier New" panose="02070309020205020404" pitchFamily="49" charset="0"/>
+              </a:rPr>
+              <a:t>função</a:t>
+            </a:r>
+            <a:r>
+              <a:rPr lang="en-US" dirty="0">
+                <a:latin typeface="Courier New" panose="02070309020205020404" pitchFamily="49" charset="0"/>
+                <a:cs typeface="Courier New" panose="02070309020205020404" pitchFamily="49" charset="0"/>
+              </a:rPr>
+              <a:t> (</a:t>
+            </a:r>
+            <a:r>
+              <a:rPr lang="en-US" b="1" dirty="0">
+                <a:latin typeface="Courier New" panose="02070309020205020404" pitchFamily="49" charset="0"/>
+                <a:cs typeface="Courier New" panose="02070309020205020404" pitchFamily="49" charset="0"/>
+              </a:rPr>
+              <a:t>ret</a:t>
+            </a:r>
+            <a:r>
+              <a:rPr lang="en-US" dirty="0">
+                <a:latin typeface="Courier New" panose="02070309020205020404" pitchFamily="49" charset="0"/>
+                <a:cs typeface="Courier New" panose="02070309020205020404" pitchFamily="49" charset="0"/>
+              </a:rPr>
+              <a:t>)</a:t>
+            </a:r>
+          </a:p>
+          <a:p>
+            <a:r>
+              <a:rPr lang="en-US" dirty="0">
+                <a:latin typeface="Courier New" panose="02070309020205020404" pitchFamily="49" charset="0"/>
+                <a:cs typeface="Courier New" panose="02070309020205020404" pitchFamily="49" charset="0"/>
+              </a:rPr>
+              <a:t>	</a:t>
+            </a:r>
+          </a:p>
+        </p:txBody>
+      </p:sp>
+    </p:spTree>
+    <p:extLst>
+      <p:ext uri="{BB962C8B-B14F-4D97-AF65-F5344CB8AC3E}">
+        <p14:creationId xmlns:p14="http://schemas.microsoft.com/office/powerpoint/2010/main" val="2347813933"/>
+      </p:ext>
+    </p:extLst>
+  </p:cSld>
+  <p:clrMapOvr>
+    <a:masterClrMapping/>
+  </p:clrMapOvr>
+  <p:timing>
+    <p:tnLst>
+      <p:par>
+        <p:cTn id="1" dur="indefinite" restart="never" nodeType="tmRoot">
+          <p:childTnLst>
+            <p:seq concurrent="1" nextAc="seek">
+              <p:cTn id="2" dur="indefinite" nodeType="mainSeq">
+                <p:childTnLst>
+                  <p:par>
+                    <p:cTn id="3" fill="hold">
+                      <p:stCondLst>
+                        <p:cond delay="indefinite"/>
+                        <p:cond evt="onBegin" delay="0">
+                          <p:tn val="2"/>
+                        </p:cond>
+                      </p:stCondLst>
+                      <p:childTnLst>
+                        <p:par>
+                          <p:cTn id="4" fill="hold">
+                            <p:stCondLst>
+                              <p:cond delay="0"/>
+                            </p:stCondLst>
+                            <p:childTnLst>
+                              <p:par>
+                                <p:cTn id="5" presetID="2" presetClass="entr" presetSubtype="4" fill="hold" grpId="0" nodeType="withEffect">
+                                  <p:stCondLst>
+                                    <p:cond delay="0"/>
+                                  </p:stCondLst>
+                                  <p:childTnLst>
+                                    <p:set>
+                                      <p:cBhvr>
+                                        <p:cTn id="6" dur="1" fill="hold">
+                                          <p:stCondLst>
+                                            <p:cond delay="0"/>
+                                          </p:stCondLst>
+                                        </p:cTn>
+                                        <p:tgtEl>
+                                          <p:spTgt spid="4"/>
+                                        </p:tgtEl>
+                                        <p:attrNameLst>
+                                          <p:attrName>style.visibility</p:attrName>
+                                        </p:attrNameLst>
+                                      </p:cBhvr>
+                                      <p:to>
+                                        <p:strVal val="visible"/>
+                                      </p:to>
+                                    </p:set>
+                                    <p:anim calcmode="lin" valueType="num">
+                                      <p:cBhvr additive="base">
+                                        <p:cTn id="7" dur="500" fill="hold"/>
+                                        <p:tgtEl>
+                                          <p:spTgt spid="4"/>
+                                        </p:tgtEl>
+                                        <p:attrNameLst>
+                                          <p:attrName>ppt_x</p:attrName>
+                                        </p:attrNameLst>
+                                      </p:cBhvr>
+                                      <p:tavLst>
+                                        <p:tav tm="0">
+                                          <p:val>
+                                            <p:strVal val="#ppt_x"/>
+                                          </p:val>
+                                        </p:tav>
+                                        <p:tav tm="100000">
+                                          <p:val>
+                                            <p:strVal val="#ppt_x"/>
+                                          </p:val>
+                                        </p:tav>
+                                      </p:tavLst>
+                                    </p:anim>
+                                    <p:anim calcmode="lin" valueType="num">
+                                      <p:cBhvr additive="base">
+                                        <p:cTn id="8" dur="500" fill="hold"/>
+                                        <p:tgtEl>
+                                          <p:spTgt spid="4"/>
+                                        </p:tgtEl>
+                                        <p:attrNameLst>
+                                          <p:attrName>ppt_y</p:attrName>
+                                        </p:attrNameLst>
+                                      </p:cBhvr>
+                                      <p:tavLst>
+                                        <p:tav tm="0">
+                                          <p:val>
+                                            <p:strVal val="1+#ppt_h/2"/>
+                                          </p:val>
+                                        </p:tav>
+                                        <p:tav tm="100000">
+                                          <p:val>
+                                            <p:strVal val="#ppt_y"/>
+                                          </p:val>
+                                        </p:tav>
+                                      </p:tavLst>
+                                    </p:anim>
+                                  </p:childTnLst>
+                                </p:cTn>
+                              </p:par>
+                            </p:childTnLst>
+                          </p:cTn>
+                        </p:par>
+                      </p:childTnLst>
+                    </p:cTn>
+                  </p:par>
+                </p:childTnLst>
+              </p:cTn>
+              <p:prevCondLst>
+                <p:cond evt="onPrev" delay="0">
+                  <p:tgtEl>
+                    <p:sldTgt/>
+                  </p:tgtEl>
+                </p:cond>
+              </p:prevCondLst>
+              <p:nextCondLst>
+                <p:cond evt="onNext" delay="0">
+                  <p:tgtEl>
+                    <p:sldTgt/>
+                  </p:tgtEl>
+                </p:cond>
+              </p:nextCondLst>
+            </p:seq>
+          </p:childTnLst>
+        </p:cTn>
+      </p:par>
+    </p:tnLst>
+    <p:bldLst>
+      <p:bldP spid="4" grpId="0" animBg="1"/>
+    </p:bldLst>
+  </p:timing>
+</p:sld>
+</file>
+
+<file path=ppt/slides/slide2.xml><?xml version="1.0" encoding="utf-8"?>
+<p:sld xmlns:a="http://schemas.openxmlformats.org/drawingml/2006/main" xmlns:r="http://schemas.openxmlformats.org/officeDocument/2006/relationships" xmlns:p="http://schemas.openxmlformats.org/presentationml/2006/main">
+  <p:cSld>
+    <p:spTree>
+      <p:nvGrpSpPr>
+        <p:cNvPr id="1" name="Shape 282"/>
+        <p:cNvGrpSpPr/>
+        <p:nvPr/>
+      </p:nvGrpSpPr>
+      <p:grpSpPr>
+        <a:xfrm>
+          <a:off x="0" y="0"/>
+          <a:ext cx="0" cy="0"/>
+          <a:chOff x="0" y="0"/>
+          <a:chExt cx="0" cy="0"/>
+        </a:xfrm>
+      </p:grpSpPr>
+      <p:sp>
+        <p:nvSpPr>
+          <p:cNvPr id="283" name="Google Shape;283;p14"/>
+          <p:cNvSpPr/>
+          <p:nvPr/>
+        </p:nvSpPr>
+        <p:spPr>
+          <a:xfrm>
+            <a:off x="1293375" y="1584150"/>
+            <a:ext cx="1303500" cy="615600"/>
+          </a:xfrm>
+          <a:prstGeom prst="roundRect">
+            <a:avLst>
+              <a:gd name="adj" fmla="val 16667"/>
+            </a:avLst>
+          </a:prstGeom>
+          <a:solidFill>
+            <a:schemeClr val="lt2"/>
+          </a:solidFill>
+          <a:ln w="9525" cap="flat" cmpd="sng">
+            <a:solidFill>
+              <a:schemeClr val="dk2"/>
+            </a:solidFill>
+            <a:prstDash val="solid"/>
+            <a:round/>
+            <a:headEnd type="none" w="sm" len="sm"/>
+            <a:tailEnd type="none" w="sm" len="sm"/>
+          </a:ln>
+        </p:spPr>
+        <p:txBody>
+          <a:bodyPr spcFirstLastPara="1" wrap="square" lIns="91425" tIns="91425" rIns="91425" bIns="91425" anchor="ctr" anchorCtr="0">
+            <a:noAutofit/>
+          </a:bodyPr>
+          <a:lstStyle/>
+          <a:p>
+            <a:pPr marL="0" lvl="0" indent="0" algn="ctr" rtl="0">
+              <a:spcBef>
+                <a:spcPts val="0"/>
+              </a:spcBef>
+              <a:spcAft>
+                <a:spcPts val="0"/>
+              </a:spcAft>
+              <a:buNone/>
+            </a:pPr>
+            <a:r>
+              <a:rPr lang="pt-BR" sz="1800" b="1"/>
+              <a:t>Análise</a:t>
+            </a:r>
+            <a:endParaRPr sz="1800" b="1"/>
+          </a:p>
+        </p:txBody>
+      </p:sp>
+      <p:sp>
+        <p:nvSpPr>
+          <p:cNvPr id="284" name="Google Shape;284;p14"/>
+          <p:cNvSpPr txBox="1"/>
+          <p:nvPr/>
+        </p:nvSpPr>
+        <p:spPr>
+          <a:xfrm>
+            <a:off x="3850125" y="1584150"/>
+            <a:ext cx="1173000" cy="615600"/>
+          </a:xfrm>
+          <a:prstGeom prst="rect">
+            <a:avLst/>
+          </a:prstGeom>
+          <a:solidFill>
+            <a:srgbClr val="F3F3F3"/>
+          </a:solidFill>
+          <a:ln w="19050" cap="flat" cmpd="sng">
+            <a:solidFill>
+              <a:srgbClr val="000000"/>
+            </a:solidFill>
+            <a:prstDash val="dot"/>
+            <a:round/>
+            <a:headEnd type="none" w="sm" len="sm"/>
+            <a:tailEnd type="none" w="sm" len="sm"/>
+          </a:ln>
+        </p:spPr>
+        <p:txBody>
+          <a:bodyPr spcFirstLastPara="1" wrap="square" lIns="91425" tIns="91425" rIns="91425" bIns="91425" anchor="t" anchorCtr="0">
+            <a:spAutoFit/>
+          </a:bodyPr>
+          <a:lstStyle/>
+          <a:p>
+            <a:pPr marL="0" lvl="0" indent="0" algn="ctr" rtl="0">
+              <a:spcBef>
+                <a:spcPts val="0"/>
+              </a:spcBef>
+              <a:spcAft>
+                <a:spcPts val="0"/>
+              </a:spcAft>
+              <a:buNone/>
+            </a:pPr>
+            <a:r>
+              <a:rPr lang="pt-BR" b="1">
+                <a:solidFill>
+                  <a:srgbClr val="666666"/>
+                </a:solidFill>
+                <a:latin typeface="Nunito"/>
+                <a:ea typeface="Nunito"/>
+                <a:cs typeface="Nunito"/>
+                <a:sym typeface="Nunito"/>
+              </a:rPr>
+              <a:t>Otimizador </a:t>
+            </a:r>
+            <a:endParaRPr b="1">
+              <a:solidFill>
+                <a:srgbClr val="666666"/>
+              </a:solidFill>
+              <a:latin typeface="Nunito"/>
+              <a:ea typeface="Nunito"/>
+              <a:cs typeface="Nunito"/>
+              <a:sym typeface="Nunito"/>
+            </a:endParaRPr>
+          </a:p>
+          <a:p>
+            <a:pPr marL="0" lvl="0" indent="0" algn="ctr" rtl="0">
+              <a:spcBef>
+                <a:spcPts val="0"/>
+              </a:spcBef>
+              <a:spcAft>
+                <a:spcPts val="0"/>
+              </a:spcAft>
+              <a:buNone/>
+            </a:pPr>
+            <a:r>
+              <a:rPr lang="pt-BR" b="1">
+                <a:solidFill>
+                  <a:srgbClr val="666666"/>
+                </a:solidFill>
+                <a:latin typeface="Nunito"/>
+                <a:ea typeface="Nunito"/>
+                <a:cs typeface="Nunito"/>
+                <a:sym typeface="Nunito"/>
+              </a:rPr>
+              <a:t>de código</a:t>
+            </a:r>
+            <a:endParaRPr b="1">
+              <a:solidFill>
+                <a:srgbClr val="666666"/>
+              </a:solidFill>
+              <a:latin typeface="Nunito"/>
+              <a:ea typeface="Nunito"/>
+              <a:cs typeface="Nunito"/>
+              <a:sym typeface="Nunito"/>
+            </a:endParaRPr>
+          </a:p>
+        </p:txBody>
+      </p:sp>
+      <p:sp>
+        <p:nvSpPr>
+          <p:cNvPr id="285" name="Google Shape;285;p14"/>
+          <p:cNvSpPr/>
+          <p:nvPr/>
+        </p:nvSpPr>
+        <p:spPr>
+          <a:xfrm>
+            <a:off x="6276375" y="1335450"/>
+            <a:ext cx="1303500" cy="1113000"/>
+          </a:xfrm>
+          <a:prstGeom prst="roundRect">
+            <a:avLst>
+              <a:gd name="adj" fmla="val 16667"/>
+            </a:avLst>
+          </a:prstGeom>
+          <a:solidFill>
+            <a:srgbClr val="660000"/>
+          </a:solidFill>
+          <a:ln w="9525" cap="flat" cmpd="sng">
+            <a:solidFill>
+              <a:schemeClr val="dk2"/>
+            </a:solidFill>
+            <a:prstDash val="solid"/>
+            <a:round/>
+            <a:headEnd type="none" w="sm" len="sm"/>
+            <a:tailEnd type="none" w="sm" len="sm"/>
+          </a:ln>
+        </p:spPr>
+        <p:txBody>
+          <a:bodyPr spcFirstLastPara="1" wrap="square" lIns="91425" tIns="91425" rIns="91425" bIns="91425" anchor="ctr" anchorCtr="0">
+            <a:noAutofit/>
+          </a:bodyPr>
+          <a:lstStyle/>
+          <a:p>
+            <a:pPr marL="0" lvl="0" indent="0" algn="ctr" rtl="0">
+              <a:spcBef>
+                <a:spcPts val="0"/>
+              </a:spcBef>
+              <a:spcAft>
+                <a:spcPts val="0"/>
+              </a:spcAft>
+              <a:buNone/>
+            </a:pPr>
+            <a:r>
+              <a:rPr lang="pt-BR" sz="1800" b="1">
+                <a:solidFill>
+                  <a:srgbClr val="D9D9D9"/>
+                </a:solidFill>
+              </a:rPr>
+              <a:t>Geração de</a:t>
+            </a:r>
+            <a:endParaRPr sz="1800" b="1">
+              <a:solidFill>
+                <a:srgbClr val="D9D9D9"/>
+              </a:solidFill>
+            </a:endParaRPr>
+          </a:p>
+          <a:p>
+            <a:pPr marL="0" lvl="0" indent="0" algn="ctr" rtl="0">
+              <a:spcBef>
+                <a:spcPts val="0"/>
+              </a:spcBef>
+              <a:spcAft>
+                <a:spcPts val="0"/>
+              </a:spcAft>
+              <a:buNone/>
+            </a:pPr>
+            <a:r>
+              <a:rPr lang="pt-BR" sz="1800" b="1">
+                <a:solidFill>
+                  <a:srgbClr val="D9D9D9"/>
+                </a:solidFill>
+              </a:rPr>
+              <a:t>Código</a:t>
+            </a:r>
+            <a:endParaRPr sz="1800" b="1">
+              <a:solidFill>
+                <a:srgbClr val="D9D9D9"/>
+              </a:solidFill>
+            </a:endParaRPr>
+          </a:p>
+        </p:txBody>
+      </p:sp>
+      <p:cxnSp>
+        <p:nvCxnSpPr>
+          <p:cNvPr id="286" name="Google Shape;286;p14"/>
+          <p:cNvCxnSpPr>
+            <a:stCxn id="283" idx="3"/>
+            <a:endCxn id="284" idx="1"/>
+          </p:cNvCxnSpPr>
+          <p:nvPr/>
+        </p:nvCxnSpPr>
+        <p:spPr>
+          <a:xfrm>
+            <a:off x="2596875" y="1891950"/>
+            <a:ext cx="1253400" cy="0"/>
+          </a:xfrm>
+          <a:prstGeom prst="straightConnector1">
+            <a:avLst/>
+          </a:prstGeom>
+          <a:noFill/>
+          <a:ln w="19050" cap="flat" cmpd="sng">
+            <a:solidFill>
+              <a:schemeClr val="dk2"/>
+            </a:solidFill>
+            <a:prstDash val="solid"/>
+            <a:round/>
+            <a:headEnd type="none" w="med" len="med"/>
+            <a:tailEnd type="triangle" w="med" len="med"/>
+          </a:ln>
+        </p:spPr>
+      </p:cxnSp>
+      <p:cxnSp>
+        <p:nvCxnSpPr>
+          <p:cNvPr id="287" name="Google Shape;287;p14"/>
+          <p:cNvCxnSpPr>
+            <a:stCxn id="284" idx="3"/>
+            <a:endCxn id="285" idx="1"/>
+          </p:cNvCxnSpPr>
+          <p:nvPr/>
+        </p:nvCxnSpPr>
+        <p:spPr>
+          <a:xfrm>
+            <a:off x="5023125" y="1891950"/>
+            <a:ext cx="1253400" cy="0"/>
+          </a:xfrm>
+          <a:prstGeom prst="straightConnector1">
+            <a:avLst/>
+          </a:prstGeom>
+          <a:noFill/>
+          <a:ln w="19050" cap="flat" cmpd="sng">
+            <a:solidFill>
+              <a:schemeClr val="dk2"/>
+            </a:solidFill>
+            <a:prstDash val="solid"/>
+            <a:round/>
+            <a:headEnd type="none" w="med" len="med"/>
+            <a:tailEnd type="triangle" w="med" len="med"/>
+          </a:ln>
+        </p:spPr>
+      </p:cxnSp>
+      <p:cxnSp>
+        <p:nvCxnSpPr>
+          <p:cNvPr id="288" name="Google Shape;288;p14"/>
+          <p:cNvCxnSpPr>
+            <a:endCxn id="283" idx="1"/>
+          </p:cNvCxnSpPr>
+          <p:nvPr/>
+        </p:nvCxnSpPr>
+        <p:spPr>
+          <a:xfrm rot="10800000" flipH="1">
+            <a:off x="290775" y="1891950"/>
+            <a:ext cx="1002600" cy="3000"/>
+          </a:xfrm>
+          <a:prstGeom prst="straightConnector1">
+            <a:avLst/>
+          </a:prstGeom>
+          <a:noFill/>
+          <a:ln w="9525" cap="flat" cmpd="sng">
+            <a:solidFill>
+              <a:schemeClr val="dk2"/>
+            </a:solidFill>
+            <a:prstDash val="solid"/>
+            <a:round/>
+            <a:headEnd type="none" w="med" len="med"/>
+            <a:tailEnd type="triangle" w="med" len="med"/>
+          </a:ln>
+        </p:spPr>
+      </p:cxnSp>
+      <p:cxnSp>
+        <p:nvCxnSpPr>
+          <p:cNvPr id="289" name="Google Shape;289;p14"/>
+          <p:cNvCxnSpPr>
+            <a:stCxn id="285" idx="3"/>
+          </p:cNvCxnSpPr>
+          <p:nvPr/>
+        </p:nvCxnSpPr>
+        <p:spPr>
+          <a:xfrm rot="10800000" flipH="1">
+            <a:off x="7579875" y="1874850"/>
+            <a:ext cx="1453800" cy="17100"/>
+          </a:xfrm>
+          <a:prstGeom prst="straightConnector1">
+            <a:avLst/>
+          </a:prstGeom>
+          <a:noFill/>
+          <a:ln w="19050" cap="flat" cmpd="sng">
+            <a:solidFill>
+              <a:schemeClr val="dk2"/>
+            </a:solidFill>
+            <a:prstDash val="solid"/>
+            <a:round/>
+            <a:headEnd type="none" w="med" len="med"/>
+            <a:tailEnd type="triangle" w="med" len="med"/>
+          </a:ln>
+        </p:spPr>
+      </p:cxnSp>
+      <p:sp>
+        <p:nvSpPr>
+          <p:cNvPr id="290" name="Google Shape;290;p14"/>
+          <p:cNvSpPr txBox="1"/>
+          <p:nvPr/>
+        </p:nvSpPr>
+        <p:spPr>
+          <a:xfrm>
+            <a:off x="290775" y="1585675"/>
+            <a:ext cx="752100" cy="615600"/>
+          </a:xfrm>
+          <a:prstGeom prst="rect">
+            <a:avLst/>
+          </a:prstGeom>
+          <a:noFill/>
+          <a:ln>
+            <a:noFill/>
+          </a:ln>
+        </p:spPr>
+        <p:txBody>
+          <a:bodyPr spcFirstLastPara="1" wrap="square" lIns="91425" tIns="91425" rIns="91425" bIns="91425" anchor="t" anchorCtr="0">
+            <a:spAutoFit/>
+          </a:bodyPr>
+          <a:lstStyle/>
+          <a:p>
+            <a:pPr marL="0" lvl="0" indent="0" algn="ctr" rtl="0">
+              <a:spcBef>
+                <a:spcPts val="0"/>
+              </a:spcBef>
+              <a:spcAft>
+                <a:spcPts val="0"/>
+              </a:spcAft>
+              <a:buNone/>
+            </a:pPr>
+            <a:r>
+              <a:rPr lang="pt-BR">
+                <a:latin typeface="Nunito"/>
+                <a:ea typeface="Nunito"/>
+                <a:cs typeface="Nunito"/>
+                <a:sym typeface="Nunito"/>
+              </a:rPr>
+              <a:t>código</a:t>
+            </a:r>
+            <a:endParaRPr>
+              <a:latin typeface="Nunito"/>
+              <a:ea typeface="Nunito"/>
+              <a:cs typeface="Nunito"/>
+              <a:sym typeface="Nunito"/>
+            </a:endParaRPr>
+          </a:p>
+          <a:p>
+            <a:pPr marL="0" lvl="0" indent="0" algn="ctr" rtl="0">
+              <a:spcBef>
+                <a:spcPts val="0"/>
+              </a:spcBef>
+              <a:spcAft>
+                <a:spcPts val="0"/>
+              </a:spcAft>
+              <a:buNone/>
+            </a:pPr>
+            <a:r>
+              <a:rPr lang="pt-BR">
+                <a:latin typeface="Nunito"/>
+                <a:ea typeface="Nunito"/>
+                <a:cs typeface="Nunito"/>
+                <a:sym typeface="Nunito"/>
+              </a:rPr>
+              <a:t>fonte</a:t>
+            </a:r>
+            <a:endParaRPr>
+              <a:latin typeface="Nunito"/>
+              <a:ea typeface="Nunito"/>
+              <a:cs typeface="Nunito"/>
+              <a:sym typeface="Nunito"/>
+            </a:endParaRPr>
+          </a:p>
+        </p:txBody>
+      </p:sp>
+      <p:sp>
+        <p:nvSpPr>
+          <p:cNvPr id="291" name="Google Shape;291;p14"/>
+          <p:cNvSpPr/>
+          <p:nvPr/>
+        </p:nvSpPr>
+        <p:spPr>
+          <a:xfrm>
+            <a:off x="3664603" y="3449067"/>
+            <a:ext cx="1584150" cy="731900"/>
+          </a:xfrm>
+          <a:prstGeom prst="flowChartProcess">
+            <a:avLst/>
+          </a:prstGeom>
+          <a:solidFill>
+            <a:srgbClr val="A4C2F4"/>
+          </a:solidFill>
+          <a:ln w="9525" cap="flat" cmpd="sng">
+            <a:solidFill>
+              <a:schemeClr val="dk2"/>
+            </a:solidFill>
+            <a:prstDash val="solid"/>
+            <a:round/>
+            <a:headEnd type="none" w="sm" len="sm"/>
+            <a:tailEnd type="none" w="sm" len="sm"/>
+          </a:ln>
+        </p:spPr>
+        <p:txBody>
+          <a:bodyPr spcFirstLastPara="1" wrap="square" lIns="91425" tIns="91425" rIns="91425" bIns="91425" anchor="ctr" anchorCtr="0">
+            <a:noAutofit/>
+          </a:bodyPr>
+          <a:lstStyle/>
+          <a:p>
+            <a:pPr marL="0" lvl="0" indent="0" algn="ctr" rtl="0">
+              <a:spcBef>
+                <a:spcPts val="0"/>
+              </a:spcBef>
+              <a:spcAft>
+                <a:spcPts val="0"/>
+              </a:spcAft>
+              <a:buNone/>
+            </a:pPr>
+            <a:r>
+              <a:rPr lang="pt-BR" sz="1700" b="1"/>
+              <a:t>Tabela de símbolos</a:t>
+            </a:r>
+            <a:endParaRPr sz="1700" b="1"/>
+          </a:p>
+        </p:txBody>
+      </p:sp>
+      <p:cxnSp>
+        <p:nvCxnSpPr>
+          <p:cNvPr id="292" name="Google Shape;292;p14"/>
+          <p:cNvCxnSpPr>
+            <a:stCxn id="283" idx="2"/>
+            <a:endCxn id="291" idx="1"/>
+          </p:cNvCxnSpPr>
+          <p:nvPr/>
+        </p:nvCxnSpPr>
+        <p:spPr>
+          <a:xfrm>
+            <a:off x="1945125" y="2199750"/>
+            <a:ext cx="1719600" cy="1615200"/>
+          </a:xfrm>
+          <a:prstGeom prst="straightConnector1">
+            <a:avLst/>
+          </a:prstGeom>
+          <a:noFill/>
+          <a:ln w="19050" cap="flat" cmpd="sng">
+            <a:solidFill>
+              <a:schemeClr val="dk2"/>
+            </a:solidFill>
+            <a:prstDash val="solid"/>
+            <a:round/>
+            <a:headEnd type="none" w="med" len="med"/>
+            <a:tailEnd type="none" w="med" len="med"/>
+          </a:ln>
+        </p:spPr>
+      </p:cxnSp>
+      <p:cxnSp>
+        <p:nvCxnSpPr>
+          <p:cNvPr id="293" name="Google Shape;293;p14"/>
+          <p:cNvCxnSpPr>
+            <a:stCxn id="291" idx="3"/>
+            <a:endCxn id="285" idx="2"/>
+          </p:cNvCxnSpPr>
+          <p:nvPr/>
+        </p:nvCxnSpPr>
+        <p:spPr>
+          <a:xfrm rot="10800000" flipH="1">
+            <a:off x="5248753" y="2448517"/>
+            <a:ext cx="1679400" cy="1366500"/>
+          </a:xfrm>
+          <a:prstGeom prst="straightConnector1">
+            <a:avLst/>
+          </a:prstGeom>
+          <a:noFill/>
+          <a:ln w="19050" cap="flat" cmpd="sng">
+            <a:solidFill>
+              <a:schemeClr val="dk2"/>
+            </a:solidFill>
+            <a:prstDash val="solid"/>
+            <a:round/>
+            <a:headEnd type="none" w="med" len="med"/>
+            <a:tailEnd type="none" w="med" len="med"/>
+          </a:ln>
+        </p:spPr>
+      </p:cxnSp>
+      <p:sp>
+        <p:nvSpPr>
+          <p:cNvPr id="294" name="Google Shape;294;p14"/>
+          <p:cNvSpPr txBox="1"/>
+          <p:nvPr/>
+        </p:nvSpPr>
+        <p:spPr>
+          <a:xfrm>
+            <a:off x="7533875" y="1565622"/>
+            <a:ext cx="1423800" cy="615600"/>
+          </a:xfrm>
+          <a:prstGeom prst="rect">
+            <a:avLst/>
+          </a:prstGeom>
+          <a:noFill/>
+          <a:ln>
+            <a:noFill/>
+          </a:ln>
+        </p:spPr>
+        <p:txBody>
+          <a:bodyPr spcFirstLastPara="1" wrap="square" lIns="91425" tIns="91425" rIns="91425" bIns="91425" anchor="t" anchorCtr="0">
+            <a:spAutoFit/>
+          </a:bodyPr>
+          <a:lstStyle/>
+          <a:p>
+            <a:pPr marL="0" lvl="0" indent="0" algn="ctr" rtl="0">
+              <a:spcBef>
+                <a:spcPts val="0"/>
+              </a:spcBef>
+              <a:spcAft>
+                <a:spcPts val="0"/>
+              </a:spcAft>
+              <a:buNone/>
+            </a:pPr>
+            <a:r>
+              <a:rPr lang="pt-BR">
+                <a:latin typeface="Nunito"/>
+                <a:ea typeface="Nunito"/>
+                <a:cs typeface="Nunito"/>
+                <a:sym typeface="Nunito"/>
+              </a:rPr>
+              <a:t>código</a:t>
+            </a:r>
+            <a:endParaRPr>
+              <a:latin typeface="Nunito"/>
+              <a:ea typeface="Nunito"/>
+              <a:cs typeface="Nunito"/>
+              <a:sym typeface="Nunito"/>
+            </a:endParaRPr>
+          </a:p>
+          <a:p>
+            <a:pPr marL="0" lvl="0" indent="0" algn="ctr" rtl="0">
+              <a:spcBef>
+                <a:spcPts val="0"/>
+              </a:spcBef>
+              <a:spcAft>
+                <a:spcPts val="0"/>
+              </a:spcAft>
+              <a:buNone/>
+            </a:pPr>
+            <a:r>
+              <a:rPr lang="pt-BR">
+                <a:latin typeface="Nunito"/>
+                <a:ea typeface="Nunito"/>
+                <a:cs typeface="Nunito"/>
+                <a:sym typeface="Nunito"/>
+              </a:rPr>
+              <a:t>máquina-alvo</a:t>
+            </a:r>
+            <a:endParaRPr>
+              <a:latin typeface="Nunito"/>
+              <a:ea typeface="Nunito"/>
+              <a:cs typeface="Nunito"/>
+              <a:sym typeface="Nunito"/>
+            </a:endParaRPr>
+          </a:p>
+        </p:txBody>
+      </p:sp>
+      <p:sp>
+        <p:nvSpPr>
+          <p:cNvPr id="295" name="Google Shape;295;p14"/>
+          <p:cNvSpPr txBox="1"/>
+          <p:nvPr/>
+        </p:nvSpPr>
+        <p:spPr>
+          <a:xfrm>
+            <a:off x="2466403" y="1595888"/>
+            <a:ext cx="1423800" cy="585000"/>
+          </a:xfrm>
+          <a:prstGeom prst="rect">
+            <a:avLst/>
+          </a:prstGeom>
+          <a:noFill/>
+          <a:ln>
+            <a:noFill/>
+          </a:ln>
+        </p:spPr>
+        <p:txBody>
+          <a:bodyPr spcFirstLastPara="1" wrap="square" lIns="91425" tIns="91425" rIns="91425" bIns="91425" anchor="t" anchorCtr="0">
+            <a:spAutoFit/>
+          </a:bodyPr>
+          <a:lstStyle/>
+          <a:p>
+            <a:pPr marL="0" lvl="0" indent="0" algn="ctr" rtl="0">
+              <a:spcBef>
+                <a:spcPts val="0"/>
+              </a:spcBef>
+              <a:spcAft>
+                <a:spcPts val="0"/>
+              </a:spcAft>
+              <a:buNone/>
+            </a:pPr>
+            <a:r>
+              <a:rPr lang="pt-BR" sz="1300">
+                <a:solidFill>
+                  <a:srgbClr val="434343"/>
+                </a:solidFill>
+                <a:latin typeface="Nunito"/>
+                <a:ea typeface="Nunito"/>
+                <a:cs typeface="Nunito"/>
+                <a:sym typeface="Nunito"/>
+              </a:rPr>
+              <a:t>código</a:t>
+            </a:r>
+            <a:endParaRPr sz="1300">
+              <a:solidFill>
+                <a:srgbClr val="434343"/>
+              </a:solidFill>
+              <a:latin typeface="Nunito"/>
+              <a:ea typeface="Nunito"/>
+              <a:cs typeface="Nunito"/>
+              <a:sym typeface="Nunito"/>
+            </a:endParaRPr>
+          </a:p>
+          <a:p>
+            <a:pPr marL="0" lvl="0" indent="0" algn="ctr" rtl="0">
+              <a:spcBef>
+                <a:spcPts val="0"/>
+              </a:spcBef>
+              <a:spcAft>
+                <a:spcPts val="0"/>
+              </a:spcAft>
+              <a:buNone/>
+            </a:pPr>
+            <a:r>
+              <a:rPr lang="pt-BR" sz="1300">
+                <a:solidFill>
+                  <a:srgbClr val="434343"/>
+                </a:solidFill>
+                <a:latin typeface="Nunito"/>
+                <a:ea typeface="Nunito"/>
+                <a:cs typeface="Nunito"/>
+                <a:sym typeface="Nunito"/>
+              </a:rPr>
+              <a:t>intermediário</a:t>
+            </a:r>
+            <a:endParaRPr sz="1300">
+              <a:solidFill>
+                <a:srgbClr val="434343"/>
+              </a:solidFill>
+              <a:latin typeface="Nunito"/>
+              <a:ea typeface="Nunito"/>
+              <a:cs typeface="Nunito"/>
+              <a:sym typeface="Nunito"/>
+            </a:endParaRPr>
+          </a:p>
+        </p:txBody>
+      </p:sp>
+      <p:sp>
+        <p:nvSpPr>
+          <p:cNvPr id="296" name="Google Shape;296;p14"/>
+          <p:cNvSpPr txBox="1"/>
+          <p:nvPr/>
+        </p:nvSpPr>
+        <p:spPr>
+          <a:xfrm>
+            <a:off x="4914828" y="1585764"/>
+            <a:ext cx="1423800" cy="585000"/>
+          </a:xfrm>
+          <a:prstGeom prst="rect">
+            <a:avLst/>
+          </a:prstGeom>
+          <a:noFill/>
+          <a:ln>
+            <a:noFill/>
+          </a:ln>
+        </p:spPr>
+        <p:txBody>
+          <a:bodyPr spcFirstLastPara="1" wrap="square" lIns="91425" tIns="91425" rIns="91425" bIns="91425" anchor="t" anchorCtr="0">
+            <a:spAutoFit/>
+          </a:bodyPr>
+          <a:lstStyle/>
+          <a:p>
+            <a:pPr marL="0" lvl="0" indent="0" algn="ctr" rtl="0">
+              <a:spcBef>
+                <a:spcPts val="0"/>
+              </a:spcBef>
+              <a:spcAft>
+                <a:spcPts val="0"/>
+              </a:spcAft>
+              <a:buNone/>
+            </a:pPr>
+            <a:r>
+              <a:rPr lang="pt-BR" sz="1300">
+                <a:solidFill>
+                  <a:srgbClr val="434343"/>
+                </a:solidFill>
+                <a:latin typeface="Nunito"/>
+                <a:ea typeface="Nunito"/>
+                <a:cs typeface="Nunito"/>
+                <a:sym typeface="Nunito"/>
+              </a:rPr>
+              <a:t>código</a:t>
+            </a:r>
+            <a:endParaRPr sz="1300">
+              <a:solidFill>
+                <a:srgbClr val="434343"/>
+              </a:solidFill>
+              <a:latin typeface="Nunito"/>
+              <a:ea typeface="Nunito"/>
+              <a:cs typeface="Nunito"/>
+              <a:sym typeface="Nunito"/>
+            </a:endParaRPr>
+          </a:p>
+          <a:p>
+            <a:pPr marL="0" lvl="0" indent="0" algn="ctr" rtl="0">
+              <a:spcBef>
+                <a:spcPts val="0"/>
+              </a:spcBef>
+              <a:spcAft>
+                <a:spcPts val="0"/>
+              </a:spcAft>
+              <a:buNone/>
+            </a:pPr>
+            <a:r>
+              <a:rPr lang="pt-BR" sz="1300">
+                <a:solidFill>
+                  <a:srgbClr val="434343"/>
+                </a:solidFill>
+                <a:latin typeface="Nunito"/>
+                <a:ea typeface="Nunito"/>
+                <a:cs typeface="Nunito"/>
+                <a:sym typeface="Nunito"/>
+              </a:rPr>
+              <a:t>intermediário</a:t>
+            </a:r>
+            <a:endParaRPr sz="1300">
+              <a:solidFill>
+                <a:srgbClr val="434343"/>
+              </a:solidFill>
+              <a:latin typeface="Nunito"/>
+              <a:ea typeface="Nunito"/>
+              <a:cs typeface="Nunito"/>
+              <a:sym typeface="Nunito"/>
+            </a:endParaRPr>
+          </a:p>
+        </p:txBody>
+      </p:sp>
+      <p:sp>
+        <p:nvSpPr>
+          <p:cNvPr id="297" name="Google Shape;297;p14"/>
+          <p:cNvSpPr txBox="1"/>
+          <p:nvPr/>
+        </p:nvSpPr>
+        <p:spPr>
+          <a:xfrm>
+            <a:off x="441150" y="210550"/>
+            <a:ext cx="2155800" cy="400200"/>
+          </a:xfrm>
+          <a:prstGeom prst="rect">
+            <a:avLst/>
+          </a:prstGeom>
+          <a:solidFill>
+            <a:srgbClr val="F3F3F3"/>
+          </a:solidFill>
+          <a:ln>
+            <a:noFill/>
+          </a:ln>
+        </p:spPr>
+        <p:txBody>
+          <a:bodyPr spcFirstLastPara="1" wrap="square" lIns="91425" tIns="91425" rIns="91425" bIns="91425" anchor="t" anchorCtr="0">
+            <a:spAutoFit/>
+          </a:bodyPr>
+          <a:lstStyle/>
+          <a:p>
+            <a:pPr marL="0" lvl="0" indent="0" algn="ctr" rtl="0">
+              <a:spcBef>
+                <a:spcPts val="0"/>
+              </a:spcBef>
+              <a:spcAft>
+                <a:spcPts val="0"/>
+              </a:spcAft>
+              <a:buNone/>
+            </a:pPr>
+            <a:r>
+              <a:rPr lang="pt-BR" b="1">
+                <a:latin typeface="Nunito"/>
+                <a:ea typeface="Nunito"/>
+                <a:cs typeface="Nunito"/>
+                <a:sym typeface="Nunito"/>
+              </a:rPr>
+              <a:t>Fluxo de compilação</a:t>
+            </a:r>
+            <a:endParaRPr b="1">
+              <a:latin typeface="Nunito"/>
+              <a:ea typeface="Nunito"/>
+              <a:cs typeface="Nunito"/>
+              <a:sym typeface="Nunito"/>
+            </a:endParaRPr>
+          </a:p>
+        </p:txBody>
+      </p:sp>
+      <p:cxnSp>
+        <p:nvCxnSpPr>
+          <p:cNvPr id="300" name="Google Shape;300;p14"/>
+          <p:cNvCxnSpPr>
+            <a:cxnSpLocks/>
+            <a:stCxn id="284" idx="2"/>
+            <a:endCxn id="291" idx="0"/>
+          </p:cNvCxnSpPr>
+          <p:nvPr/>
+        </p:nvCxnSpPr>
+        <p:spPr>
+          <a:xfrm>
+            <a:off x="4436625" y="2199750"/>
+            <a:ext cx="20053" cy="1249317"/>
+          </a:xfrm>
+          <a:prstGeom prst="straightConnector1">
+            <a:avLst/>
+          </a:prstGeom>
+          <a:noFill/>
+          <a:ln w="9525" cap="flat" cmpd="sng">
+            <a:solidFill>
+              <a:schemeClr val="dk2"/>
+            </a:solidFill>
+            <a:prstDash val="solid"/>
+            <a:round/>
+            <a:headEnd type="none" w="med" len="med"/>
+            <a:tailEnd type="none" w="med" len="med"/>
+          </a:ln>
+        </p:spPr>
+      </p:cxnSp>
+    </p:spTree>
+  </p:cSld>
+  <p:clrMapOvr>
+    <a:masterClrMapping/>
+  </p:clrMapOvr>
+  <p:timing>
+    <p:tnLst>
+      <p:par>
+        <p:cTn id="1" dur="indefinite" restart="never" nodeType="tmRoot">
+          <p:childTnLst>
+            <p:seq concurrent="1" nextAc="seek">
+              <p:cTn id="2" dur="indefinite" nodeType="mainSeq">
+                <p:childTnLst>
+                  <p:par>
+                    <p:cTn id="3" fill="hold">
+                      <p:stCondLst>
+                        <p:cond delay="indefinite"/>
+                        <p:cond evt="onBegin" delay="0">
+                          <p:tn val="2"/>
+                        </p:cond>
+                      </p:stCondLst>
+                      <p:childTnLst>
+                        <p:par>
+                          <p:cTn id="4" fill="hold">
+                            <p:stCondLst>
+                              <p:cond delay="0"/>
+                            </p:stCondLst>
+                            <p:childTnLst>
+                              <p:par>
+                                <p:cTn id="5" presetID="10" presetClass="entr" presetSubtype="0" fill="hold" nodeType="withEffect">
+                                  <p:stCondLst>
+                                    <p:cond delay="0"/>
+                                  </p:stCondLst>
+                                  <p:childTnLst>
+                                    <p:set>
+                                      <p:cBhvr>
+                                        <p:cTn id="6" dur="1" fill="hold">
+                                          <p:stCondLst>
+                                            <p:cond delay="0"/>
+                                          </p:stCondLst>
+                                        </p:cTn>
+                                        <p:tgtEl>
+                                          <p:spTgt spid="300"/>
+                                        </p:tgtEl>
+                                        <p:attrNameLst>
+                                          <p:attrName>style.visibility</p:attrName>
+                                        </p:attrNameLst>
+                                      </p:cBhvr>
+                                      <p:to>
+                                        <p:strVal val="visible"/>
+                                      </p:to>
+                                    </p:set>
+                                    <p:animEffect transition="in" filter="fade">
+                                      <p:cBhvr>
+                                        <p:cTn id="7" dur="1000"/>
+                                        <p:tgtEl>
+                                          <p:spTgt spid="300"/>
+                                        </p:tgtEl>
+                                      </p:cBhvr>
+                                    </p:animEffect>
+                                  </p:childTnLst>
+                                </p:cTn>
+                              </p:par>
+                            </p:childTnLst>
+                          </p:cTn>
+                        </p:par>
+                      </p:childTnLst>
+                    </p:cTn>
+                  </p:par>
+                </p:childTnLst>
+              </p:cTn>
+              <p:prevCondLst>
+                <p:cond evt="onPrev" delay="0">
+                  <p:tgtEl>
+                    <p:sldTgt/>
+                  </p:tgtEl>
+                </p:cond>
+              </p:prevCondLst>
+              <p:nextCondLst>
+                <p:cond evt="onNext" delay="0">
+                  <p:tgtEl>
+                    <p:sldTgt/>
+                  </p:tgtEl>
+                </p:cond>
+              </p:nextCondLst>
+            </p:seq>
+          </p:childTnLst>
+        </p:cTn>
+      </p:par>
+    </p:tnLst>
+  </p:timing>
+</p:sld>
+</file>
+
+<file path=ppt/slides/slide20.xml><?xml version="1.0" encoding="utf-8"?>
 <p:sld xmlns:a="http://schemas.openxmlformats.org/drawingml/2006/main" xmlns:r="http://schemas.openxmlformats.org/officeDocument/2006/relationships" xmlns:p="http://schemas.openxmlformats.org/presentationml/2006/main">
   <p:cSld>
     <p:spTree>
@@ -26276,6 +28038,20 @@
                 <a:cs typeface="Courier New" panose="02070309020205020404" pitchFamily="49" charset="0"/>
               </a:rPr>
               <a:t>#224 </a:t>
+            </a:r>
+            <a:r>
+              <a:rPr lang="pt-BR" dirty="0" err="1">
+                <a:latin typeface="Courier New" panose="02070309020205020404" pitchFamily="49" charset="0"/>
+                <a:cs typeface="Courier New" panose="02070309020205020404" pitchFamily="49" charset="0"/>
+              </a:rPr>
+              <a:t>ret</a:t>
+            </a:r>
+            <a:r>
+              <a:rPr lang="pt-BR" dirty="0">
+                <a:latin typeface="Courier New" panose="02070309020205020404" pitchFamily="49" charset="0"/>
+                <a:cs typeface="Courier New" panose="02070309020205020404" pitchFamily="49" charset="0"/>
+              </a:rPr>
+              <a:t>      # </a:t>
             </a:r>
             <a:r>
               <a:rPr lang="pt-BR" dirty="0" err="1">
@@ -28561,994 +30337,7 @@
 </p:sld>
 </file>
 
-<file path=ppt/slides/slide2.xml><?xml version="1.0" encoding="utf-8"?>
-<p:sld xmlns:a="http://schemas.openxmlformats.org/drawingml/2006/main" xmlns:r="http://schemas.openxmlformats.org/officeDocument/2006/relationships" xmlns:p="http://schemas.openxmlformats.org/presentationml/2006/main">
-  <p:cSld>
-    <p:spTree>
-      <p:nvGrpSpPr>
-        <p:cNvPr id="1" name="Shape 282"/>
-        <p:cNvGrpSpPr/>
-        <p:nvPr/>
-      </p:nvGrpSpPr>
-      <p:grpSpPr>
-        <a:xfrm>
-          <a:off x="0" y="0"/>
-          <a:ext cx="0" cy="0"/>
-          <a:chOff x="0" y="0"/>
-          <a:chExt cx="0" cy="0"/>
-        </a:xfrm>
-      </p:grpSpPr>
-      <p:sp>
-        <p:nvSpPr>
-          <p:cNvPr id="283" name="Google Shape;283;p14"/>
-          <p:cNvSpPr/>
-          <p:nvPr/>
-        </p:nvSpPr>
-        <p:spPr>
-          <a:xfrm>
-            <a:off x="1293375" y="1584150"/>
-            <a:ext cx="1303500" cy="615600"/>
-          </a:xfrm>
-          <a:prstGeom prst="roundRect">
-            <a:avLst>
-              <a:gd name="adj" fmla="val 16667"/>
-            </a:avLst>
-          </a:prstGeom>
-          <a:solidFill>
-            <a:schemeClr val="lt2"/>
-          </a:solidFill>
-          <a:ln w="9525" cap="flat" cmpd="sng">
-            <a:solidFill>
-              <a:schemeClr val="dk2"/>
-            </a:solidFill>
-            <a:prstDash val="solid"/>
-            <a:round/>
-            <a:headEnd type="none" w="sm" len="sm"/>
-            <a:tailEnd type="none" w="sm" len="sm"/>
-          </a:ln>
-        </p:spPr>
-        <p:txBody>
-          <a:bodyPr spcFirstLastPara="1" wrap="square" lIns="91425" tIns="91425" rIns="91425" bIns="91425" anchor="ctr" anchorCtr="0">
-            <a:noAutofit/>
-          </a:bodyPr>
-          <a:lstStyle/>
-          <a:p>
-            <a:pPr marL="0" lvl="0" indent="0" algn="ctr" rtl="0">
-              <a:spcBef>
-                <a:spcPts val="0"/>
-              </a:spcBef>
-              <a:spcAft>
-                <a:spcPts val="0"/>
-              </a:spcAft>
-              <a:buNone/>
-            </a:pPr>
-            <a:r>
-              <a:rPr lang="pt-BR" sz="1800" b="1"/>
-              <a:t>Análise</a:t>
-            </a:r>
-            <a:endParaRPr sz="1800" b="1"/>
-          </a:p>
-        </p:txBody>
-      </p:sp>
-      <p:sp>
-        <p:nvSpPr>
-          <p:cNvPr id="284" name="Google Shape;284;p14"/>
-          <p:cNvSpPr txBox="1"/>
-          <p:nvPr/>
-        </p:nvSpPr>
-        <p:spPr>
-          <a:xfrm>
-            <a:off x="3850125" y="1584150"/>
-            <a:ext cx="1173000" cy="615600"/>
-          </a:xfrm>
-          <a:prstGeom prst="rect">
-            <a:avLst/>
-          </a:prstGeom>
-          <a:solidFill>
-            <a:srgbClr val="F3F3F3"/>
-          </a:solidFill>
-          <a:ln w="19050" cap="flat" cmpd="sng">
-            <a:solidFill>
-              <a:srgbClr val="000000"/>
-            </a:solidFill>
-            <a:prstDash val="dot"/>
-            <a:round/>
-            <a:headEnd type="none" w="sm" len="sm"/>
-            <a:tailEnd type="none" w="sm" len="sm"/>
-          </a:ln>
-        </p:spPr>
-        <p:txBody>
-          <a:bodyPr spcFirstLastPara="1" wrap="square" lIns="91425" tIns="91425" rIns="91425" bIns="91425" anchor="t" anchorCtr="0">
-            <a:spAutoFit/>
-          </a:bodyPr>
-          <a:lstStyle/>
-          <a:p>
-            <a:pPr marL="0" lvl="0" indent="0" algn="ctr" rtl="0">
-              <a:spcBef>
-                <a:spcPts val="0"/>
-              </a:spcBef>
-              <a:spcAft>
-                <a:spcPts val="0"/>
-              </a:spcAft>
-              <a:buNone/>
-            </a:pPr>
-            <a:r>
-              <a:rPr lang="pt-BR" b="1">
-                <a:solidFill>
-                  <a:srgbClr val="666666"/>
-                </a:solidFill>
-                <a:latin typeface="Nunito"/>
-                <a:ea typeface="Nunito"/>
-                <a:cs typeface="Nunito"/>
-                <a:sym typeface="Nunito"/>
-              </a:rPr>
-              <a:t>Otimizador </a:t>
-            </a:r>
-            <a:endParaRPr b="1">
-              <a:solidFill>
-                <a:srgbClr val="666666"/>
-              </a:solidFill>
-              <a:latin typeface="Nunito"/>
-              <a:ea typeface="Nunito"/>
-              <a:cs typeface="Nunito"/>
-              <a:sym typeface="Nunito"/>
-            </a:endParaRPr>
-          </a:p>
-          <a:p>
-            <a:pPr marL="0" lvl="0" indent="0" algn="ctr" rtl="0">
-              <a:spcBef>
-                <a:spcPts val="0"/>
-              </a:spcBef>
-              <a:spcAft>
-                <a:spcPts val="0"/>
-              </a:spcAft>
-              <a:buNone/>
-            </a:pPr>
-            <a:r>
-              <a:rPr lang="pt-BR" b="1">
-                <a:solidFill>
-                  <a:srgbClr val="666666"/>
-                </a:solidFill>
-                <a:latin typeface="Nunito"/>
-                <a:ea typeface="Nunito"/>
-                <a:cs typeface="Nunito"/>
-                <a:sym typeface="Nunito"/>
-              </a:rPr>
-              <a:t>de código</a:t>
-            </a:r>
-            <a:endParaRPr b="1">
-              <a:solidFill>
-                <a:srgbClr val="666666"/>
-              </a:solidFill>
-              <a:latin typeface="Nunito"/>
-              <a:ea typeface="Nunito"/>
-              <a:cs typeface="Nunito"/>
-              <a:sym typeface="Nunito"/>
-            </a:endParaRPr>
-          </a:p>
-        </p:txBody>
-      </p:sp>
-      <p:sp>
-        <p:nvSpPr>
-          <p:cNvPr id="285" name="Google Shape;285;p14"/>
-          <p:cNvSpPr/>
-          <p:nvPr/>
-        </p:nvSpPr>
-        <p:spPr>
-          <a:xfrm>
-            <a:off x="6276375" y="1335450"/>
-            <a:ext cx="1303500" cy="1113000"/>
-          </a:xfrm>
-          <a:prstGeom prst="roundRect">
-            <a:avLst>
-              <a:gd name="adj" fmla="val 16667"/>
-            </a:avLst>
-          </a:prstGeom>
-          <a:solidFill>
-            <a:srgbClr val="660000"/>
-          </a:solidFill>
-          <a:ln w="9525" cap="flat" cmpd="sng">
-            <a:solidFill>
-              <a:schemeClr val="dk2"/>
-            </a:solidFill>
-            <a:prstDash val="solid"/>
-            <a:round/>
-            <a:headEnd type="none" w="sm" len="sm"/>
-            <a:tailEnd type="none" w="sm" len="sm"/>
-          </a:ln>
-        </p:spPr>
-        <p:txBody>
-          <a:bodyPr spcFirstLastPara="1" wrap="square" lIns="91425" tIns="91425" rIns="91425" bIns="91425" anchor="ctr" anchorCtr="0">
-            <a:noAutofit/>
-          </a:bodyPr>
-          <a:lstStyle/>
-          <a:p>
-            <a:pPr marL="0" lvl="0" indent="0" algn="ctr" rtl="0">
-              <a:spcBef>
-                <a:spcPts val="0"/>
-              </a:spcBef>
-              <a:spcAft>
-                <a:spcPts val="0"/>
-              </a:spcAft>
-              <a:buNone/>
-            </a:pPr>
-            <a:r>
-              <a:rPr lang="pt-BR" sz="1800" b="1">
-                <a:solidFill>
-                  <a:srgbClr val="D9D9D9"/>
-                </a:solidFill>
-              </a:rPr>
-              <a:t>Geração de</a:t>
-            </a:r>
-            <a:endParaRPr sz="1800" b="1">
-              <a:solidFill>
-                <a:srgbClr val="D9D9D9"/>
-              </a:solidFill>
-            </a:endParaRPr>
-          </a:p>
-          <a:p>
-            <a:pPr marL="0" lvl="0" indent="0" algn="ctr" rtl="0">
-              <a:spcBef>
-                <a:spcPts val="0"/>
-              </a:spcBef>
-              <a:spcAft>
-                <a:spcPts val="0"/>
-              </a:spcAft>
-              <a:buNone/>
-            </a:pPr>
-            <a:r>
-              <a:rPr lang="pt-BR" sz="1800" b="1">
-                <a:solidFill>
-                  <a:srgbClr val="D9D9D9"/>
-                </a:solidFill>
-              </a:rPr>
-              <a:t>Código</a:t>
-            </a:r>
-            <a:endParaRPr sz="1800" b="1">
-              <a:solidFill>
-                <a:srgbClr val="D9D9D9"/>
-              </a:solidFill>
-            </a:endParaRPr>
-          </a:p>
-        </p:txBody>
-      </p:sp>
-      <p:cxnSp>
-        <p:nvCxnSpPr>
-          <p:cNvPr id="286" name="Google Shape;286;p14"/>
-          <p:cNvCxnSpPr>
-            <a:stCxn id="283" idx="3"/>
-            <a:endCxn id="284" idx="1"/>
-          </p:cNvCxnSpPr>
-          <p:nvPr/>
-        </p:nvCxnSpPr>
-        <p:spPr>
-          <a:xfrm>
-            <a:off x="2596875" y="1891950"/>
-            <a:ext cx="1253400" cy="0"/>
-          </a:xfrm>
-          <a:prstGeom prst="straightConnector1">
-            <a:avLst/>
-          </a:prstGeom>
-          <a:noFill/>
-          <a:ln w="19050" cap="flat" cmpd="sng">
-            <a:solidFill>
-              <a:schemeClr val="dk2"/>
-            </a:solidFill>
-            <a:prstDash val="solid"/>
-            <a:round/>
-            <a:headEnd type="none" w="med" len="med"/>
-            <a:tailEnd type="triangle" w="med" len="med"/>
-          </a:ln>
-        </p:spPr>
-      </p:cxnSp>
-      <p:cxnSp>
-        <p:nvCxnSpPr>
-          <p:cNvPr id="287" name="Google Shape;287;p14"/>
-          <p:cNvCxnSpPr>
-            <a:stCxn id="284" idx="3"/>
-            <a:endCxn id="285" idx="1"/>
-          </p:cNvCxnSpPr>
-          <p:nvPr/>
-        </p:nvCxnSpPr>
-        <p:spPr>
-          <a:xfrm>
-            <a:off x="5023125" y="1891950"/>
-            <a:ext cx="1253400" cy="0"/>
-          </a:xfrm>
-          <a:prstGeom prst="straightConnector1">
-            <a:avLst/>
-          </a:prstGeom>
-          <a:noFill/>
-          <a:ln w="19050" cap="flat" cmpd="sng">
-            <a:solidFill>
-              <a:schemeClr val="dk2"/>
-            </a:solidFill>
-            <a:prstDash val="solid"/>
-            <a:round/>
-            <a:headEnd type="none" w="med" len="med"/>
-            <a:tailEnd type="triangle" w="med" len="med"/>
-          </a:ln>
-        </p:spPr>
-      </p:cxnSp>
-      <p:cxnSp>
-        <p:nvCxnSpPr>
-          <p:cNvPr id="288" name="Google Shape;288;p14"/>
-          <p:cNvCxnSpPr>
-            <a:endCxn id="283" idx="1"/>
-          </p:cNvCxnSpPr>
-          <p:nvPr/>
-        </p:nvCxnSpPr>
-        <p:spPr>
-          <a:xfrm rot="10800000" flipH="1">
-            <a:off x="290775" y="1891950"/>
-            <a:ext cx="1002600" cy="3000"/>
-          </a:xfrm>
-          <a:prstGeom prst="straightConnector1">
-            <a:avLst/>
-          </a:prstGeom>
-          <a:noFill/>
-          <a:ln w="9525" cap="flat" cmpd="sng">
-            <a:solidFill>
-              <a:schemeClr val="dk2"/>
-            </a:solidFill>
-            <a:prstDash val="solid"/>
-            <a:round/>
-            <a:headEnd type="none" w="med" len="med"/>
-            <a:tailEnd type="triangle" w="med" len="med"/>
-          </a:ln>
-        </p:spPr>
-      </p:cxnSp>
-      <p:cxnSp>
-        <p:nvCxnSpPr>
-          <p:cNvPr id="289" name="Google Shape;289;p14"/>
-          <p:cNvCxnSpPr>
-            <a:stCxn id="285" idx="3"/>
-          </p:cNvCxnSpPr>
-          <p:nvPr/>
-        </p:nvCxnSpPr>
-        <p:spPr>
-          <a:xfrm rot="10800000" flipH="1">
-            <a:off x="7579875" y="1874850"/>
-            <a:ext cx="1453800" cy="17100"/>
-          </a:xfrm>
-          <a:prstGeom prst="straightConnector1">
-            <a:avLst/>
-          </a:prstGeom>
-          <a:noFill/>
-          <a:ln w="19050" cap="flat" cmpd="sng">
-            <a:solidFill>
-              <a:schemeClr val="dk2"/>
-            </a:solidFill>
-            <a:prstDash val="solid"/>
-            <a:round/>
-            <a:headEnd type="none" w="med" len="med"/>
-            <a:tailEnd type="triangle" w="med" len="med"/>
-          </a:ln>
-        </p:spPr>
-      </p:cxnSp>
-      <p:sp>
-        <p:nvSpPr>
-          <p:cNvPr id="290" name="Google Shape;290;p14"/>
-          <p:cNvSpPr txBox="1"/>
-          <p:nvPr/>
-        </p:nvSpPr>
-        <p:spPr>
-          <a:xfrm>
-            <a:off x="290775" y="1585675"/>
-            <a:ext cx="752100" cy="615600"/>
-          </a:xfrm>
-          <a:prstGeom prst="rect">
-            <a:avLst/>
-          </a:prstGeom>
-          <a:noFill/>
-          <a:ln>
-            <a:noFill/>
-          </a:ln>
-        </p:spPr>
-        <p:txBody>
-          <a:bodyPr spcFirstLastPara="1" wrap="square" lIns="91425" tIns="91425" rIns="91425" bIns="91425" anchor="t" anchorCtr="0">
-            <a:spAutoFit/>
-          </a:bodyPr>
-          <a:lstStyle/>
-          <a:p>
-            <a:pPr marL="0" lvl="0" indent="0" algn="ctr" rtl="0">
-              <a:spcBef>
-                <a:spcPts val="0"/>
-              </a:spcBef>
-              <a:spcAft>
-                <a:spcPts val="0"/>
-              </a:spcAft>
-              <a:buNone/>
-            </a:pPr>
-            <a:r>
-              <a:rPr lang="pt-BR">
-                <a:latin typeface="Nunito"/>
-                <a:ea typeface="Nunito"/>
-                <a:cs typeface="Nunito"/>
-                <a:sym typeface="Nunito"/>
-              </a:rPr>
-              <a:t>código</a:t>
-            </a:r>
-            <a:endParaRPr>
-              <a:latin typeface="Nunito"/>
-              <a:ea typeface="Nunito"/>
-              <a:cs typeface="Nunito"/>
-              <a:sym typeface="Nunito"/>
-            </a:endParaRPr>
-          </a:p>
-          <a:p>
-            <a:pPr marL="0" lvl="0" indent="0" algn="ctr" rtl="0">
-              <a:spcBef>
-                <a:spcPts val="0"/>
-              </a:spcBef>
-              <a:spcAft>
-                <a:spcPts val="0"/>
-              </a:spcAft>
-              <a:buNone/>
-            </a:pPr>
-            <a:r>
-              <a:rPr lang="pt-BR">
-                <a:latin typeface="Nunito"/>
-                <a:ea typeface="Nunito"/>
-                <a:cs typeface="Nunito"/>
-                <a:sym typeface="Nunito"/>
-              </a:rPr>
-              <a:t>fonte</a:t>
-            </a:r>
-            <a:endParaRPr>
-              <a:latin typeface="Nunito"/>
-              <a:ea typeface="Nunito"/>
-              <a:cs typeface="Nunito"/>
-              <a:sym typeface="Nunito"/>
-            </a:endParaRPr>
-          </a:p>
-        </p:txBody>
-      </p:sp>
-      <p:sp>
-        <p:nvSpPr>
-          <p:cNvPr id="291" name="Google Shape;291;p14"/>
-          <p:cNvSpPr/>
-          <p:nvPr/>
-        </p:nvSpPr>
-        <p:spPr>
-          <a:xfrm>
-            <a:off x="3664603" y="3449067"/>
-            <a:ext cx="1584150" cy="731900"/>
-          </a:xfrm>
-          <a:prstGeom prst="flowChartProcess">
-            <a:avLst/>
-          </a:prstGeom>
-          <a:solidFill>
-            <a:srgbClr val="A4C2F4"/>
-          </a:solidFill>
-          <a:ln w="9525" cap="flat" cmpd="sng">
-            <a:solidFill>
-              <a:schemeClr val="dk2"/>
-            </a:solidFill>
-            <a:prstDash val="solid"/>
-            <a:round/>
-            <a:headEnd type="none" w="sm" len="sm"/>
-            <a:tailEnd type="none" w="sm" len="sm"/>
-          </a:ln>
-        </p:spPr>
-        <p:txBody>
-          <a:bodyPr spcFirstLastPara="1" wrap="square" lIns="91425" tIns="91425" rIns="91425" bIns="91425" anchor="ctr" anchorCtr="0">
-            <a:noAutofit/>
-          </a:bodyPr>
-          <a:lstStyle/>
-          <a:p>
-            <a:pPr marL="0" lvl="0" indent="0" algn="ctr" rtl="0">
-              <a:spcBef>
-                <a:spcPts val="0"/>
-              </a:spcBef>
-              <a:spcAft>
-                <a:spcPts val="0"/>
-              </a:spcAft>
-              <a:buNone/>
-            </a:pPr>
-            <a:r>
-              <a:rPr lang="pt-BR" sz="1700" b="1"/>
-              <a:t>Tabela de símbolos</a:t>
-            </a:r>
-            <a:endParaRPr sz="1700" b="1"/>
-          </a:p>
-        </p:txBody>
-      </p:sp>
-      <p:cxnSp>
-        <p:nvCxnSpPr>
-          <p:cNvPr id="292" name="Google Shape;292;p14"/>
-          <p:cNvCxnSpPr>
-            <a:stCxn id="283" idx="2"/>
-            <a:endCxn id="291" idx="1"/>
-          </p:cNvCxnSpPr>
-          <p:nvPr/>
-        </p:nvCxnSpPr>
-        <p:spPr>
-          <a:xfrm>
-            <a:off x="1945125" y="2199750"/>
-            <a:ext cx="1719600" cy="1615200"/>
-          </a:xfrm>
-          <a:prstGeom prst="straightConnector1">
-            <a:avLst/>
-          </a:prstGeom>
-          <a:noFill/>
-          <a:ln w="19050" cap="flat" cmpd="sng">
-            <a:solidFill>
-              <a:schemeClr val="dk2"/>
-            </a:solidFill>
-            <a:prstDash val="solid"/>
-            <a:round/>
-            <a:headEnd type="none" w="med" len="med"/>
-            <a:tailEnd type="none" w="med" len="med"/>
-          </a:ln>
-        </p:spPr>
-      </p:cxnSp>
-      <p:cxnSp>
-        <p:nvCxnSpPr>
-          <p:cNvPr id="293" name="Google Shape;293;p14"/>
-          <p:cNvCxnSpPr>
-            <a:stCxn id="291" idx="3"/>
-            <a:endCxn id="285" idx="2"/>
-          </p:cNvCxnSpPr>
-          <p:nvPr/>
-        </p:nvCxnSpPr>
-        <p:spPr>
-          <a:xfrm rot="10800000" flipH="1">
-            <a:off x="5248753" y="2448517"/>
-            <a:ext cx="1679400" cy="1366500"/>
-          </a:xfrm>
-          <a:prstGeom prst="straightConnector1">
-            <a:avLst/>
-          </a:prstGeom>
-          <a:noFill/>
-          <a:ln w="19050" cap="flat" cmpd="sng">
-            <a:solidFill>
-              <a:schemeClr val="dk2"/>
-            </a:solidFill>
-            <a:prstDash val="solid"/>
-            <a:round/>
-            <a:headEnd type="none" w="med" len="med"/>
-            <a:tailEnd type="none" w="med" len="med"/>
-          </a:ln>
-        </p:spPr>
-      </p:cxnSp>
-      <p:sp>
-        <p:nvSpPr>
-          <p:cNvPr id="294" name="Google Shape;294;p14"/>
-          <p:cNvSpPr txBox="1"/>
-          <p:nvPr/>
-        </p:nvSpPr>
-        <p:spPr>
-          <a:xfrm>
-            <a:off x="7533875" y="1565622"/>
-            <a:ext cx="1423800" cy="615600"/>
-          </a:xfrm>
-          <a:prstGeom prst="rect">
-            <a:avLst/>
-          </a:prstGeom>
-          <a:noFill/>
-          <a:ln>
-            <a:noFill/>
-          </a:ln>
-        </p:spPr>
-        <p:txBody>
-          <a:bodyPr spcFirstLastPara="1" wrap="square" lIns="91425" tIns="91425" rIns="91425" bIns="91425" anchor="t" anchorCtr="0">
-            <a:spAutoFit/>
-          </a:bodyPr>
-          <a:lstStyle/>
-          <a:p>
-            <a:pPr marL="0" lvl="0" indent="0" algn="ctr" rtl="0">
-              <a:spcBef>
-                <a:spcPts val="0"/>
-              </a:spcBef>
-              <a:spcAft>
-                <a:spcPts val="0"/>
-              </a:spcAft>
-              <a:buNone/>
-            </a:pPr>
-            <a:r>
-              <a:rPr lang="pt-BR">
-                <a:latin typeface="Nunito"/>
-                <a:ea typeface="Nunito"/>
-                <a:cs typeface="Nunito"/>
-                <a:sym typeface="Nunito"/>
-              </a:rPr>
-              <a:t>código</a:t>
-            </a:r>
-            <a:endParaRPr>
-              <a:latin typeface="Nunito"/>
-              <a:ea typeface="Nunito"/>
-              <a:cs typeface="Nunito"/>
-              <a:sym typeface="Nunito"/>
-            </a:endParaRPr>
-          </a:p>
-          <a:p>
-            <a:pPr marL="0" lvl="0" indent="0" algn="ctr" rtl="0">
-              <a:spcBef>
-                <a:spcPts val="0"/>
-              </a:spcBef>
-              <a:spcAft>
-                <a:spcPts val="0"/>
-              </a:spcAft>
-              <a:buNone/>
-            </a:pPr>
-            <a:r>
-              <a:rPr lang="pt-BR">
-                <a:latin typeface="Nunito"/>
-                <a:ea typeface="Nunito"/>
-                <a:cs typeface="Nunito"/>
-                <a:sym typeface="Nunito"/>
-              </a:rPr>
-              <a:t>máquina-alvo</a:t>
-            </a:r>
-            <a:endParaRPr>
-              <a:latin typeface="Nunito"/>
-              <a:ea typeface="Nunito"/>
-              <a:cs typeface="Nunito"/>
-              <a:sym typeface="Nunito"/>
-            </a:endParaRPr>
-          </a:p>
-        </p:txBody>
-      </p:sp>
-      <p:sp>
-        <p:nvSpPr>
-          <p:cNvPr id="295" name="Google Shape;295;p14"/>
-          <p:cNvSpPr txBox="1"/>
-          <p:nvPr/>
-        </p:nvSpPr>
-        <p:spPr>
-          <a:xfrm>
-            <a:off x="2466403" y="1595888"/>
-            <a:ext cx="1423800" cy="585000"/>
-          </a:xfrm>
-          <a:prstGeom prst="rect">
-            <a:avLst/>
-          </a:prstGeom>
-          <a:noFill/>
-          <a:ln>
-            <a:noFill/>
-          </a:ln>
-        </p:spPr>
-        <p:txBody>
-          <a:bodyPr spcFirstLastPara="1" wrap="square" lIns="91425" tIns="91425" rIns="91425" bIns="91425" anchor="t" anchorCtr="0">
-            <a:spAutoFit/>
-          </a:bodyPr>
-          <a:lstStyle/>
-          <a:p>
-            <a:pPr marL="0" lvl="0" indent="0" algn="ctr" rtl="0">
-              <a:spcBef>
-                <a:spcPts val="0"/>
-              </a:spcBef>
-              <a:spcAft>
-                <a:spcPts val="0"/>
-              </a:spcAft>
-              <a:buNone/>
-            </a:pPr>
-            <a:r>
-              <a:rPr lang="pt-BR" sz="1300">
-                <a:solidFill>
-                  <a:srgbClr val="434343"/>
-                </a:solidFill>
-                <a:latin typeface="Nunito"/>
-                <a:ea typeface="Nunito"/>
-                <a:cs typeface="Nunito"/>
-                <a:sym typeface="Nunito"/>
-              </a:rPr>
-              <a:t>código</a:t>
-            </a:r>
-            <a:endParaRPr sz="1300">
-              <a:solidFill>
-                <a:srgbClr val="434343"/>
-              </a:solidFill>
-              <a:latin typeface="Nunito"/>
-              <a:ea typeface="Nunito"/>
-              <a:cs typeface="Nunito"/>
-              <a:sym typeface="Nunito"/>
-            </a:endParaRPr>
-          </a:p>
-          <a:p>
-            <a:pPr marL="0" lvl="0" indent="0" algn="ctr" rtl="0">
-              <a:spcBef>
-                <a:spcPts val="0"/>
-              </a:spcBef>
-              <a:spcAft>
-                <a:spcPts val="0"/>
-              </a:spcAft>
-              <a:buNone/>
-            </a:pPr>
-            <a:r>
-              <a:rPr lang="pt-BR" sz="1300">
-                <a:solidFill>
-                  <a:srgbClr val="434343"/>
-                </a:solidFill>
-                <a:latin typeface="Nunito"/>
-                <a:ea typeface="Nunito"/>
-                <a:cs typeface="Nunito"/>
-                <a:sym typeface="Nunito"/>
-              </a:rPr>
-              <a:t>intermediário</a:t>
-            </a:r>
-            <a:endParaRPr sz="1300">
-              <a:solidFill>
-                <a:srgbClr val="434343"/>
-              </a:solidFill>
-              <a:latin typeface="Nunito"/>
-              <a:ea typeface="Nunito"/>
-              <a:cs typeface="Nunito"/>
-              <a:sym typeface="Nunito"/>
-            </a:endParaRPr>
-          </a:p>
-        </p:txBody>
-      </p:sp>
-      <p:sp>
-        <p:nvSpPr>
-          <p:cNvPr id="296" name="Google Shape;296;p14"/>
-          <p:cNvSpPr txBox="1"/>
-          <p:nvPr/>
-        </p:nvSpPr>
-        <p:spPr>
-          <a:xfrm>
-            <a:off x="4914828" y="1585764"/>
-            <a:ext cx="1423800" cy="585000"/>
-          </a:xfrm>
-          <a:prstGeom prst="rect">
-            <a:avLst/>
-          </a:prstGeom>
-          <a:noFill/>
-          <a:ln>
-            <a:noFill/>
-          </a:ln>
-        </p:spPr>
-        <p:txBody>
-          <a:bodyPr spcFirstLastPara="1" wrap="square" lIns="91425" tIns="91425" rIns="91425" bIns="91425" anchor="t" anchorCtr="0">
-            <a:spAutoFit/>
-          </a:bodyPr>
-          <a:lstStyle/>
-          <a:p>
-            <a:pPr marL="0" lvl="0" indent="0" algn="ctr" rtl="0">
-              <a:spcBef>
-                <a:spcPts val="0"/>
-              </a:spcBef>
-              <a:spcAft>
-                <a:spcPts val="0"/>
-              </a:spcAft>
-              <a:buNone/>
-            </a:pPr>
-            <a:r>
-              <a:rPr lang="pt-BR" sz="1300">
-                <a:solidFill>
-                  <a:srgbClr val="434343"/>
-                </a:solidFill>
-                <a:latin typeface="Nunito"/>
-                <a:ea typeface="Nunito"/>
-                <a:cs typeface="Nunito"/>
-                <a:sym typeface="Nunito"/>
-              </a:rPr>
-              <a:t>código</a:t>
-            </a:r>
-            <a:endParaRPr sz="1300">
-              <a:solidFill>
-                <a:srgbClr val="434343"/>
-              </a:solidFill>
-              <a:latin typeface="Nunito"/>
-              <a:ea typeface="Nunito"/>
-              <a:cs typeface="Nunito"/>
-              <a:sym typeface="Nunito"/>
-            </a:endParaRPr>
-          </a:p>
-          <a:p>
-            <a:pPr marL="0" lvl="0" indent="0" algn="ctr" rtl="0">
-              <a:spcBef>
-                <a:spcPts val="0"/>
-              </a:spcBef>
-              <a:spcAft>
-                <a:spcPts val="0"/>
-              </a:spcAft>
-              <a:buNone/>
-            </a:pPr>
-            <a:r>
-              <a:rPr lang="pt-BR" sz="1300">
-                <a:solidFill>
-                  <a:srgbClr val="434343"/>
-                </a:solidFill>
-                <a:latin typeface="Nunito"/>
-                <a:ea typeface="Nunito"/>
-                <a:cs typeface="Nunito"/>
-                <a:sym typeface="Nunito"/>
-              </a:rPr>
-              <a:t>intermediário</a:t>
-            </a:r>
-            <a:endParaRPr sz="1300">
-              <a:solidFill>
-                <a:srgbClr val="434343"/>
-              </a:solidFill>
-              <a:latin typeface="Nunito"/>
-              <a:ea typeface="Nunito"/>
-              <a:cs typeface="Nunito"/>
-              <a:sym typeface="Nunito"/>
-            </a:endParaRPr>
-          </a:p>
-        </p:txBody>
-      </p:sp>
-      <p:sp>
-        <p:nvSpPr>
-          <p:cNvPr id="297" name="Google Shape;297;p14"/>
-          <p:cNvSpPr txBox="1"/>
-          <p:nvPr/>
-        </p:nvSpPr>
-        <p:spPr>
-          <a:xfrm>
-            <a:off x="441150" y="210550"/>
-            <a:ext cx="2155800" cy="400200"/>
-          </a:xfrm>
-          <a:prstGeom prst="rect">
-            <a:avLst/>
-          </a:prstGeom>
-          <a:solidFill>
-            <a:srgbClr val="F3F3F3"/>
-          </a:solidFill>
-          <a:ln>
-            <a:noFill/>
-          </a:ln>
-        </p:spPr>
-        <p:txBody>
-          <a:bodyPr spcFirstLastPara="1" wrap="square" lIns="91425" tIns="91425" rIns="91425" bIns="91425" anchor="t" anchorCtr="0">
-            <a:spAutoFit/>
-          </a:bodyPr>
-          <a:lstStyle/>
-          <a:p>
-            <a:pPr marL="0" lvl="0" indent="0" algn="ctr" rtl="0">
-              <a:spcBef>
-                <a:spcPts val="0"/>
-              </a:spcBef>
-              <a:spcAft>
-                <a:spcPts val="0"/>
-              </a:spcAft>
-              <a:buNone/>
-            </a:pPr>
-            <a:r>
-              <a:rPr lang="pt-BR" b="1">
-                <a:latin typeface="Nunito"/>
-                <a:ea typeface="Nunito"/>
-                <a:cs typeface="Nunito"/>
-                <a:sym typeface="Nunito"/>
-              </a:rPr>
-              <a:t>Fluxo de compilação</a:t>
-            </a:r>
-            <a:endParaRPr b="1">
-              <a:latin typeface="Nunito"/>
-              <a:ea typeface="Nunito"/>
-              <a:cs typeface="Nunito"/>
-              <a:sym typeface="Nunito"/>
-            </a:endParaRPr>
-          </a:p>
-        </p:txBody>
-      </p:sp>
-      <p:cxnSp>
-        <p:nvCxnSpPr>
-          <p:cNvPr id="300" name="Google Shape;300;p14"/>
-          <p:cNvCxnSpPr>
-            <a:cxnSpLocks/>
-            <a:stCxn id="284" idx="2"/>
-            <a:endCxn id="291" idx="0"/>
-          </p:cNvCxnSpPr>
-          <p:nvPr/>
-        </p:nvCxnSpPr>
-        <p:spPr>
-          <a:xfrm>
-            <a:off x="4436625" y="2199750"/>
-            <a:ext cx="20053" cy="1249317"/>
-          </a:xfrm>
-          <a:prstGeom prst="straightConnector1">
-            <a:avLst/>
-          </a:prstGeom>
-          <a:noFill/>
-          <a:ln w="9525" cap="flat" cmpd="sng">
-            <a:solidFill>
-              <a:schemeClr val="dk2"/>
-            </a:solidFill>
-            <a:prstDash val="solid"/>
-            <a:round/>
-            <a:headEnd type="none" w="med" len="med"/>
-            <a:tailEnd type="none" w="med" len="med"/>
-          </a:ln>
-        </p:spPr>
-      </p:cxnSp>
-    </p:spTree>
-  </p:cSld>
-  <p:clrMapOvr>
-    <a:masterClrMapping/>
-  </p:clrMapOvr>
-  <p:timing>
-    <p:tnLst>
-      <p:par>
-        <p:cTn id="1" dur="indefinite" restart="never" nodeType="tmRoot">
-          <p:childTnLst>
-            <p:seq concurrent="1" nextAc="seek">
-              <p:cTn id="2" dur="indefinite" nodeType="mainSeq">
-                <p:childTnLst>
-                  <p:par>
-                    <p:cTn id="3" fill="hold">
-                      <p:stCondLst>
-                        <p:cond delay="indefinite"/>
-                        <p:cond evt="onBegin" delay="0">
-                          <p:tn val="2"/>
-                        </p:cond>
-                      </p:stCondLst>
-                      <p:childTnLst>
-                        <p:par>
-                          <p:cTn id="4" fill="hold">
-                            <p:stCondLst>
-                              <p:cond delay="0"/>
-                            </p:stCondLst>
-                            <p:childTnLst>
-                              <p:par>
-                                <p:cTn id="5" presetID="10" presetClass="entr" presetSubtype="0" fill="hold" nodeType="withEffect">
-                                  <p:stCondLst>
-                                    <p:cond delay="0"/>
-                                  </p:stCondLst>
-                                  <p:childTnLst>
-                                    <p:set>
-                                      <p:cBhvr>
-                                        <p:cTn id="6" dur="1" fill="hold">
-                                          <p:stCondLst>
-                                            <p:cond delay="0"/>
-                                          </p:stCondLst>
-                                        </p:cTn>
-                                        <p:tgtEl>
-                                          <p:spTgt spid="300"/>
-                                        </p:tgtEl>
-                                        <p:attrNameLst>
-                                          <p:attrName>style.visibility</p:attrName>
-                                        </p:attrNameLst>
-                                      </p:cBhvr>
-                                      <p:to>
-                                        <p:strVal val="visible"/>
-                                      </p:to>
-                                    </p:set>
-                                    <p:animEffect transition="in" filter="fade">
-                                      <p:cBhvr>
-                                        <p:cTn id="7" dur="1000"/>
-                                        <p:tgtEl>
-                                          <p:spTgt spid="300"/>
-                                        </p:tgtEl>
-                                      </p:cBhvr>
-                                    </p:animEffect>
-                                  </p:childTnLst>
-                                </p:cTn>
-                              </p:par>
-                            </p:childTnLst>
-                          </p:cTn>
-                        </p:par>
-                      </p:childTnLst>
-                    </p:cTn>
-                  </p:par>
-                </p:childTnLst>
-              </p:cTn>
-              <p:prevCondLst>
-                <p:cond evt="onPrev" delay="0">
-                  <p:tgtEl>
-                    <p:sldTgt/>
-                  </p:tgtEl>
-                </p:cond>
-              </p:prevCondLst>
-              <p:nextCondLst>
-                <p:cond evt="onNext" delay="0">
-                  <p:tgtEl>
-                    <p:sldTgt/>
-                  </p:tgtEl>
-                </p:cond>
-              </p:nextCondLst>
-            </p:seq>
-          </p:childTnLst>
-        </p:cTn>
-      </p:par>
-    </p:tnLst>
-  </p:timing>
-</p:sld>
-</file>
-
-<file path=ppt/slides/slide20.xml><?xml version="1.0" encoding="utf-8"?>
+<file path=ppt/slides/slide21.xml><?xml version="1.0" encoding="utf-8"?>
 <p:sld xmlns:a="http://schemas.openxmlformats.org/drawingml/2006/main" xmlns:r="http://schemas.openxmlformats.org/officeDocument/2006/relationships" xmlns:p="http://schemas.openxmlformats.org/presentationml/2006/main">
   <p:cSld>
     <p:spTree>
@@ -29678,7 +30467,7 @@
 </p:sld>
 </file>
 
-<file path=ppt/slides/slide21.xml><?xml version="1.0" encoding="utf-8"?>
+<file path=ppt/slides/slide22.xml><?xml version="1.0" encoding="utf-8"?>
 <p:sld xmlns:a="http://schemas.openxmlformats.org/drawingml/2006/main" xmlns:r="http://schemas.openxmlformats.org/officeDocument/2006/relationships" xmlns:p="http://schemas.openxmlformats.org/presentationml/2006/main">
   <p:cSld>
     <p:spTree>
@@ -32226,7 +33015,12 @@
             <p:ph type="title"/>
           </p:nvPr>
         </p:nvSpPr>
-        <p:spPr/>
+        <p:spPr>
+          <a:xfrm>
+            <a:off x="324086" y="44171"/>
+            <a:ext cx="7030500" cy="999300"/>
+          </a:xfrm>
+        </p:spPr>
         <p:txBody>
           <a:bodyPr/>
           <a:lstStyle/>
@@ -32641,7 +33435,7 @@
         </p:nvSpPr>
         <p:spPr>
           <a:xfrm>
-            <a:off x="3754581" y="1211595"/>
+            <a:off x="3761507" y="619527"/>
             <a:ext cx="3061855" cy="916809"/>
           </a:xfrm>
           <a:prstGeom prst="rect">
@@ -32686,7 +33480,7 @@
                 <a:latin typeface="Courier New" panose="02070309020205020404" pitchFamily="49" charset="0"/>
                 <a:cs typeface="Courier New" panose="02070309020205020404" pitchFamily="49" charset="0"/>
               </a:rPr>
-              <a:t>long</a:t>
+              <a:t>int</a:t>
             </a:r>
             <a:r>
               <a:rPr lang="pt-BR" sz="1600" dirty="0">
@@ -32696,7 +33490,7 @@
                 <a:latin typeface="Courier New" panose="02070309020205020404" pitchFamily="49" charset="0"/>
                 <a:cs typeface="Courier New" panose="02070309020205020404" pitchFamily="49" charset="0"/>
               </a:rPr>
-              <a:t> a, b, c, v[8]; </a:t>
+              <a:t> a, b = 55, v[4]; </a:t>
             </a:r>
           </a:p>
           <a:p>
@@ -32723,8 +33517,8 @@
         </p:nvSpPr>
         <p:spPr>
           <a:xfrm>
-            <a:off x="3408217" y="3012638"/>
-            <a:ext cx="3768437" cy="1947289"/>
+            <a:off x="3408217" y="1861458"/>
+            <a:ext cx="3768437" cy="3098470"/>
           </a:xfrm>
           <a:prstGeom prst="rect">
             <a:avLst/>
@@ -32756,6 +33550,16 @@
                 <a:latin typeface="Courier New" panose="02070309020205020404" pitchFamily="49" charset="0"/>
                 <a:cs typeface="Courier New" panose="02070309020205020404" pitchFamily="49" charset="0"/>
               </a:rPr>
+              <a:t>	</a:t>
+            </a:r>
+            <a:r>
+              <a:rPr lang="pt-BR" sz="1600" b="1" dirty="0">
+                <a:solidFill>
+                  <a:srgbClr val="FF0000"/>
+                </a:solidFill>
+                <a:latin typeface="Courier New" panose="02070309020205020404" pitchFamily="49" charset="0"/>
+                <a:cs typeface="Courier New" panose="02070309020205020404" pitchFamily="49" charset="0"/>
+              </a:rPr>
               <a:t>.data</a:t>
             </a:r>
           </a:p>
@@ -32768,10 +33572,18 @@
                 <a:latin typeface="Courier New" panose="02070309020205020404" pitchFamily="49" charset="0"/>
                 <a:cs typeface="Courier New" panose="02070309020205020404" pitchFamily="49" charset="0"/>
               </a:rPr>
-              <a:t>#a</a:t>
-            </a:r>
-          </a:p>
-          <a:p>
+              <a:t>	.</a:t>
+            </a:r>
+            <a:r>
+              <a:rPr lang="pt-BR" sz="1600" b="1" dirty="0" err="1">
+                <a:solidFill>
+                  <a:schemeClr val="bg2"/>
+                </a:solidFill>
+                <a:latin typeface="Courier New" panose="02070309020205020404" pitchFamily="49" charset="0"/>
+                <a:cs typeface="Courier New" panose="02070309020205020404" pitchFamily="49" charset="0"/>
+              </a:rPr>
+              <a:t>globl</a:t>
+            </a:r>
             <a:r>
               <a:rPr lang="pt-BR" sz="1600" b="1" dirty="0">
                 <a:solidFill>
@@ -32780,7 +33592,7 @@
                 <a:latin typeface="Courier New" panose="02070309020205020404" pitchFamily="49" charset="0"/>
                 <a:cs typeface="Courier New" panose="02070309020205020404" pitchFamily="49" charset="0"/>
               </a:rPr>
-              <a:t>#b</a:t>
+              <a:t> a</a:t>
             </a:r>
           </a:p>
           <a:p>
@@ -32792,7 +33604,7 @@
                 <a:latin typeface="Courier New" panose="02070309020205020404" pitchFamily="49" charset="0"/>
                 <a:cs typeface="Courier New" panose="02070309020205020404" pitchFamily="49" charset="0"/>
               </a:rPr>
-              <a:t>#c</a:t>
+              <a:t>a:</a:t>
             </a:r>
           </a:p>
           <a:p>
@@ -32804,49 +33616,172 @@
                 <a:latin typeface="Courier New" panose="02070309020205020404" pitchFamily="49" charset="0"/>
                 <a:cs typeface="Courier New" panose="02070309020205020404" pitchFamily="49" charset="0"/>
               </a:rPr>
-              <a:t>#v</a:t>
-            </a:r>
-          </a:p>
-          <a:p>
-            <a:r>
-              <a:rPr lang="pt-BR" sz="1600" dirty="0">
+              <a:t>	.</a:t>
+            </a:r>
+            <a:r>
+              <a:rPr lang="pt-BR" sz="1600" b="1" dirty="0" err="1">
                 <a:solidFill>
                   <a:schemeClr val="bg2"/>
                 </a:solidFill>
                 <a:latin typeface="Courier New" panose="02070309020205020404" pitchFamily="49" charset="0"/>
                 <a:cs typeface="Courier New" panose="02070309020205020404" pitchFamily="49" charset="0"/>
               </a:rPr>
-              <a:t>.global</a:t>
-            </a:r>
-          </a:p>
-          <a:p>
-            <a:r>
-              <a:rPr lang="pt-BR" sz="1600" dirty="0">
+              <a:t>space</a:t>
+            </a:r>
+            <a:r>
+              <a:rPr lang="pt-BR" sz="1600" b="1" dirty="0">
                 <a:solidFill>
                   <a:schemeClr val="bg2"/>
                 </a:solidFill>
                 <a:latin typeface="Courier New" panose="02070309020205020404" pitchFamily="49" charset="0"/>
                 <a:cs typeface="Courier New" panose="02070309020205020404" pitchFamily="49" charset="0"/>
               </a:rPr>
-              <a:t>.</a:t>
-            </a:r>
-            <a:r>
-              <a:rPr lang="pt-BR" sz="1600" dirty="0" err="1">
+              <a:t> 4</a:t>
+            </a:r>
+          </a:p>
+          <a:p>
+            <a:r>
+              <a:rPr lang="pt-BR" sz="1600" b="1" dirty="0">
                 <a:solidFill>
                   <a:schemeClr val="bg2"/>
                 </a:solidFill>
                 <a:latin typeface="Courier New" panose="02070309020205020404" pitchFamily="49" charset="0"/>
                 <a:cs typeface="Courier New" panose="02070309020205020404" pitchFamily="49" charset="0"/>
               </a:rPr>
-              <a:t>section</a:t>
-            </a:r>
-            <a:endParaRPr lang="pt-BR" sz="1600" dirty="0">
-              <a:solidFill>
-                <a:schemeClr val="bg2"/>
-              </a:solidFill>
-              <a:latin typeface="Courier New" panose="02070309020205020404" pitchFamily="49" charset="0"/>
-              <a:cs typeface="Courier New" panose="02070309020205020404" pitchFamily="49" charset="0"/>
-            </a:endParaRPr>
+              <a:t>	.</a:t>
+            </a:r>
+            <a:r>
+              <a:rPr lang="pt-BR" sz="1600" b="1" dirty="0" err="1">
+                <a:solidFill>
+                  <a:schemeClr val="bg2"/>
+                </a:solidFill>
+                <a:latin typeface="Courier New" panose="02070309020205020404" pitchFamily="49" charset="0"/>
+                <a:cs typeface="Courier New" panose="02070309020205020404" pitchFamily="49" charset="0"/>
+              </a:rPr>
+              <a:t>globl</a:t>
+            </a:r>
+            <a:r>
+              <a:rPr lang="pt-BR" sz="1600" b="1" dirty="0">
+                <a:solidFill>
+                  <a:schemeClr val="bg2"/>
+                </a:solidFill>
+                <a:latin typeface="Courier New" panose="02070309020205020404" pitchFamily="49" charset="0"/>
+                <a:cs typeface="Courier New" panose="02070309020205020404" pitchFamily="49" charset="0"/>
+              </a:rPr>
+              <a:t> b</a:t>
+            </a:r>
+          </a:p>
+          <a:p>
+            <a:r>
+              <a:rPr lang="pt-BR" sz="1600" b="1" dirty="0">
+                <a:solidFill>
+                  <a:schemeClr val="bg2"/>
+                </a:solidFill>
+                <a:latin typeface="Courier New" panose="02070309020205020404" pitchFamily="49" charset="0"/>
+                <a:cs typeface="Courier New" panose="02070309020205020404" pitchFamily="49" charset="0"/>
+              </a:rPr>
+              <a:t>b:	</a:t>
+            </a:r>
+          </a:p>
+          <a:p>
+            <a:r>
+              <a:rPr lang="pt-BR" sz="1600" b="1" dirty="0">
+                <a:solidFill>
+                  <a:schemeClr val="bg2"/>
+                </a:solidFill>
+                <a:latin typeface="Courier New" panose="02070309020205020404" pitchFamily="49" charset="0"/>
+                <a:cs typeface="Courier New" panose="02070309020205020404" pitchFamily="49" charset="0"/>
+              </a:rPr>
+              <a:t>	.word 55</a:t>
+            </a:r>
+          </a:p>
+          <a:p>
+            <a:r>
+              <a:rPr lang="pt-BR" sz="1600" b="1" dirty="0">
+                <a:solidFill>
+                  <a:schemeClr val="bg2"/>
+                </a:solidFill>
+                <a:latin typeface="Courier New" panose="02070309020205020404" pitchFamily="49" charset="0"/>
+                <a:cs typeface="Courier New" panose="02070309020205020404" pitchFamily="49" charset="0"/>
+              </a:rPr>
+              <a:t>	.</a:t>
+            </a:r>
+            <a:r>
+              <a:rPr lang="pt-BR" sz="1600" b="1" dirty="0" err="1">
+                <a:solidFill>
+                  <a:schemeClr val="bg2"/>
+                </a:solidFill>
+                <a:latin typeface="Courier New" panose="02070309020205020404" pitchFamily="49" charset="0"/>
+                <a:cs typeface="Courier New" panose="02070309020205020404" pitchFamily="49" charset="0"/>
+              </a:rPr>
+              <a:t>globl</a:t>
+            </a:r>
+            <a:r>
+              <a:rPr lang="pt-BR" sz="1600" b="1" dirty="0">
+                <a:solidFill>
+                  <a:schemeClr val="bg2"/>
+                </a:solidFill>
+                <a:latin typeface="Courier New" panose="02070309020205020404" pitchFamily="49" charset="0"/>
+                <a:cs typeface="Courier New" panose="02070309020205020404" pitchFamily="49" charset="0"/>
+              </a:rPr>
+              <a:t> v</a:t>
+            </a:r>
+          </a:p>
+          <a:p>
+            <a:r>
+              <a:rPr lang="pt-BR" sz="1600" b="1" dirty="0">
+                <a:solidFill>
+                  <a:schemeClr val="bg2"/>
+                </a:solidFill>
+                <a:latin typeface="Courier New" panose="02070309020205020404" pitchFamily="49" charset="0"/>
+                <a:cs typeface="Courier New" panose="02070309020205020404" pitchFamily="49" charset="0"/>
+              </a:rPr>
+              <a:t>v:</a:t>
+            </a:r>
+          </a:p>
+          <a:p>
+            <a:r>
+              <a:rPr lang="pt-BR" sz="1600" b="1" dirty="0">
+                <a:solidFill>
+                  <a:schemeClr val="bg2"/>
+                </a:solidFill>
+                <a:latin typeface="Courier New" panose="02070309020205020404" pitchFamily="49" charset="0"/>
+                <a:cs typeface="Courier New" panose="02070309020205020404" pitchFamily="49" charset="0"/>
+              </a:rPr>
+              <a:t>	.</a:t>
+            </a:r>
+            <a:r>
+              <a:rPr lang="pt-BR" sz="1600" b="1" dirty="0" err="1">
+                <a:solidFill>
+                  <a:schemeClr val="bg2"/>
+                </a:solidFill>
+                <a:latin typeface="Courier New" panose="02070309020205020404" pitchFamily="49" charset="0"/>
+                <a:cs typeface="Courier New" panose="02070309020205020404" pitchFamily="49" charset="0"/>
+              </a:rPr>
+              <a:t>space</a:t>
+            </a:r>
+            <a:r>
+              <a:rPr lang="pt-BR" sz="1600" b="1" dirty="0">
+                <a:solidFill>
+                  <a:schemeClr val="bg2"/>
+                </a:solidFill>
+                <a:latin typeface="Courier New" panose="02070309020205020404" pitchFamily="49" charset="0"/>
+                <a:cs typeface="Courier New" panose="02070309020205020404" pitchFamily="49" charset="0"/>
+              </a:rPr>
+              <a:t> 16</a:t>
+            </a:r>
+          </a:p>
+          <a:p>
+            <a:r>
+              <a:rPr lang="pt-BR" sz="1600" dirty="0">
+                <a:solidFill>
+                  <a:srgbClr val="FF0000"/>
+                </a:solidFill>
+                <a:latin typeface="Courier New" panose="02070309020205020404" pitchFamily="49" charset="0"/>
+                <a:cs typeface="Courier New" panose="02070309020205020404" pitchFamily="49" charset="0"/>
+              </a:rPr>
+              <a:t>__start</a:t>
+            </a:r>
           </a:p>
           <a:p>
             <a:r>
@@ -32885,8 +33820,8 @@
         </p:nvCxnSpPr>
         <p:spPr>
           <a:xfrm>
-            <a:off x="5285509" y="2128404"/>
-            <a:ext cx="6927" cy="884234"/>
+            <a:off x="5292435" y="1536336"/>
+            <a:ext cx="1" cy="325122"/>
           </a:xfrm>
           <a:prstGeom prst="straightConnector1">
             <a:avLst/>
@@ -32924,7 +33859,7 @@
         </p:nvSpPr>
         <p:spPr>
           <a:xfrm>
-            <a:off x="5410202" y="2343043"/>
+            <a:off x="6861464" y="1338051"/>
             <a:ext cx="2514598" cy="523220"/>
           </a:xfrm>
           <a:prstGeom prst="rect">
@@ -32946,7 +33881,7 @@
           <a:p>
             <a:r>
               <a:rPr lang="pt-BR" dirty="0"/>
-              <a:t>Endereços de memória (#)</a:t>
+              <a:t>Endereços de memória</a:t>
             </a:r>
           </a:p>
         </p:txBody>
@@ -35239,8 +36174,8 @@
       <p:bldP spid="9" grpId="0"/>
       <p:bldP spid="10" grpId="0"/>
       <p:bldP spid="11" grpId="0"/>
-      <p:bldP spid="61" grpId="0"/>
-      <p:bldP spid="20" grpId="0"/>
+      <p:bldP spid="61" grpId="0" animBg="1"/>
+      <p:bldP spid="20" grpId="0" animBg="1"/>
     </p:bldLst>
   </p:timing>
 </p:sld>

</xml_diff>